<commit_message>
meghana week 4 homework
</commit_message>
<xml_diff>
--- a/Week04-Tours/Homework/meghana_week4_homework/meghana_week4_homework.pptx
+++ b/Week04-Tours/Homework/meghana_week4_homework/meghana_week4_homework.pptx
@@ -10,6 +10,8 @@
     <p:sldId id="258" r:id="rId4"/>
     <p:sldId id="259" r:id="rId5"/>
     <p:sldId id="260" r:id="rId6"/>
+    <p:sldId id="261" r:id="rId7"/>
+    <p:sldId id="262" r:id="rId8"/>
   </p:sldIdLst>
   <p:sldSz cx="12192000" cy="6858000"/>
   <p:notesSz cx="6858000" cy="9144000"/>
@@ -158,10 +160,9 @@
           </a:lstStyle>
           <a:p>
             <a:r>
-              <a:rPr lang="en-US" smtClean="0"/>
+              <a:rPr lang="en-US"/>
               <a:t>Click to edit Master title style</a:t>
             </a:r>
-            <a:endParaRPr lang="en-US"/>
           </a:p>
         </p:txBody>
       </p:sp>
@@ -223,10 +224,9 @@
           </a:lstStyle>
           <a:p>
             <a:r>
-              <a:rPr lang="en-US" smtClean="0"/>
+              <a:rPr lang="en-US"/>
               <a:t>Click to edit Master subtitle style</a:t>
             </a:r>
-            <a:endParaRPr lang="en-US"/>
           </a:p>
         </p:txBody>
       </p:sp>
@@ -247,7 +247,7 @@
           <a:p>
             <a:fld id="{D8862F2C-12C1-455F-815A-C164D68E1F7B}" type="datetimeFigureOut">
               <a:rPr lang="en-US" smtClean="0"/>
-              <a:t>2/11/2020</a:t>
+              <a:t>2/13/2020</a:t>
             </a:fld>
             <a:endParaRPr lang="en-US"/>
           </a:p>
@@ -341,10 +341,9 @@
           <a:lstStyle/>
           <a:p>
             <a:r>
-              <a:rPr lang="en-US" smtClean="0"/>
+              <a:rPr lang="en-US"/>
               <a:t>Click to edit Master title style</a:t>
             </a:r>
-            <a:endParaRPr lang="en-US"/>
           </a:p>
         </p:txBody>
       </p:sp>
@@ -365,38 +364,37 @@
           <a:p>
             <a:pPr lvl="0"/>
             <a:r>
-              <a:rPr lang="en-US" smtClean="0"/>
+              <a:rPr lang="en-US"/>
               <a:t>Click to edit Master text styles</a:t>
             </a:r>
           </a:p>
           <a:p>
             <a:pPr lvl="1"/>
             <a:r>
-              <a:rPr lang="en-US" smtClean="0"/>
+              <a:rPr lang="en-US"/>
               <a:t>Second level</a:t>
             </a:r>
           </a:p>
           <a:p>
             <a:pPr lvl="2"/>
             <a:r>
-              <a:rPr lang="en-US" smtClean="0"/>
+              <a:rPr lang="en-US"/>
               <a:t>Third level</a:t>
             </a:r>
           </a:p>
           <a:p>
             <a:pPr lvl="3"/>
             <a:r>
-              <a:rPr lang="en-US" smtClean="0"/>
+              <a:rPr lang="en-US"/>
               <a:t>Fourth level</a:t>
             </a:r>
           </a:p>
           <a:p>
             <a:pPr lvl="4"/>
             <a:r>
-              <a:rPr lang="en-US" smtClean="0"/>
+              <a:rPr lang="en-US"/>
               <a:t>Fifth level</a:t>
             </a:r>
-            <a:endParaRPr lang="en-US"/>
           </a:p>
         </p:txBody>
       </p:sp>
@@ -417,7 +415,7 @@
           <a:p>
             <a:fld id="{D8862F2C-12C1-455F-815A-C164D68E1F7B}" type="datetimeFigureOut">
               <a:rPr lang="en-US" smtClean="0"/>
-              <a:t>2/11/2020</a:t>
+              <a:t>2/13/2020</a:t>
             </a:fld>
             <a:endParaRPr lang="en-US"/>
           </a:p>
@@ -516,10 +514,9 @@
           <a:lstStyle/>
           <a:p>
             <a:r>
-              <a:rPr lang="en-US" smtClean="0"/>
+              <a:rPr lang="en-US"/>
               <a:t>Click to edit Master title style</a:t>
             </a:r>
-            <a:endParaRPr lang="en-US"/>
           </a:p>
         </p:txBody>
       </p:sp>
@@ -545,38 +542,37 @@
           <a:p>
             <a:pPr lvl="0"/>
             <a:r>
-              <a:rPr lang="en-US" smtClean="0"/>
+              <a:rPr lang="en-US"/>
               <a:t>Click to edit Master text styles</a:t>
             </a:r>
           </a:p>
           <a:p>
             <a:pPr lvl="1"/>
             <a:r>
-              <a:rPr lang="en-US" smtClean="0"/>
+              <a:rPr lang="en-US"/>
               <a:t>Second level</a:t>
             </a:r>
           </a:p>
           <a:p>
             <a:pPr lvl="2"/>
             <a:r>
-              <a:rPr lang="en-US" smtClean="0"/>
+              <a:rPr lang="en-US"/>
               <a:t>Third level</a:t>
             </a:r>
           </a:p>
           <a:p>
             <a:pPr lvl="3"/>
             <a:r>
-              <a:rPr lang="en-US" smtClean="0"/>
+              <a:rPr lang="en-US"/>
               <a:t>Fourth level</a:t>
             </a:r>
           </a:p>
           <a:p>
             <a:pPr lvl="4"/>
             <a:r>
-              <a:rPr lang="en-US" smtClean="0"/>
+              <a:rPr lang="en-US"/>
               <a:t>Fifth level</a:t>
             </a:r>
-            <a:endParaRPr lang="en-US"/>
           </a:p>
         </p:txBody>
       </p:sp>
@@ -597,7 +593,7 @@
           <a:p>
             <a:fld id="{D8862F2C-12C1-455F-815A-C164D68E1F7B}" type="datetimeFigureOut">
               <a:rPr lang="en-US" smtClean="0"/>
-              <a:t>2/11/2020</a:t>
+              <a:t>2/13/2020</a:t>
             </a:fld>
             <a:endParaRPr lang="en-US"/>
           </a:p>
@@ -691,10 +687,9 @@
           <a:lstStyle/>
           <a:p>
             <a:r>
-              <a:rPr lang="en-US" smtClean="0"/>
+              <a:rPr lang="en-US"/>
               <a:t>Click to edit Master title style</a:t>
             </a:r>
-            <a:endParaRPr lang="en-US"/>
           </a:p>
         </p:txBody>
       </p:sp>
@@ -715,38 +710,37 @@
           <a:p>
             <a:pPr lvl="0"/>
             <a:r>
-              <a:rPr lang="en-US" smtClean="0"/>
+              <a:rPr lang="en-US"/>
               <a:t>Click to edit Master text styles</a:t>
             </a:r>
           </a:p>
           <a:p>
             <a:pPr lvl="1"/>
             <a:r>
-              <a:rPr lang="en-US" smtClean="0"/>
+              <a:rPr lang="en-US"/>
               <a:t>Second level</a:t>
             </a:r>
           </a:p>
           <a:p>
             <a:pPr lvl="2"/>
             <a:r>
-              <a:rPr lang="en-US" smtClean="0"/>
+              <a:rPr lang="en-US"/>
               <a:t>Third level</a:t>
             </a:r>
           </a:p>
           <a:p>
             <a:pPr lvl="3"/>
             <a:r>
-              <a:rPr lang="en-US" smtClean="0"/>
+              <a:rPr lang="en-US"/>
               <a:t>Fourth level</a:t>
             </a:r>
           </a:p>
           <a:p>
             <a:pPr lvl="4"/>
             <a:r>
-              <a:rPr lang="en-US" smtClean="0"/>
+              <a:rPr lang="en-US"/>
               <a:t>Fifth level</a:t>
             </a:r>
-            <a:endParaRPr lang="en-US"/>
           </a:p>
         </p:txBody>
       </p:sp>
@@ -767,7 +761,7 @@
           <a:p>
             <a:fld id="{D8862F2C-12C1-455F-815A-C164D68E1F7B}" type="datetimeFigureOut">
               <a:rPr lang="en-US" smtClean="0"/>
-              <a:t>2/11/2020</a:t>
+              <a:t>2/13/2020</a:t>
             </a:fld>
             <a:endParaRPr lang="en-US"/>
           </a:p>
@@ -870,10 +864,9 @@
           </a:lstStyle>
           <a:p>
             <a:r>
-              <a:rPr lang="en-US" smtClean="0"/>
+              <a:rPr lang="en-US"/>
               <a:t>Click to edit Master title style</a:t>
             </a:r>
-            <a:endParaRPr lang="en-US"/>
           </a:p>
         </p:txBody>
       </p:sp>
@@ -990,7 +983,7 @@
           <a:p>
             <a:pPr lvl="0"/>
             <a:r>
-              <a:rPr lang="en-US" smtClean="0"/>
+              <a:rPr lang="en-US"/>
               <a:t>Click to edit Master text styles</a:t>
             </a:r>
           </a:p>
@@ -1013,7 +1006,7 @@
           <a:p>
             <a:fld id="{D8862F2C-12C1-455F-815A-C164D68E1F7B}" type="datetimeFigureOut">
               <a:rPr lang="en-US" smtClean="0"/>
-              <a:t>2/11/2020</a:t>
+              <a:t>2/13/2020</a:t>
             </a:fld>
             <a:endParaRPr lang="en-US"/>
           </a:p>
@@ -1107,10 +1100,9 @@
           <a:lstStyle/>
           <a:p>
             <a:r>
-              <a:rPr lang="en-US" smtClean="0"/>
+              <a:rPr lang="en-US"/>
               <a:t>Click to edit Master title style</a:t>
             </a:r>
-            <a:endParaRPr lang="en-US"/>
           </a:p>
         </p:txBody>
       </p:sp>
@@ -1136,38 +1128,37 @@
           <a:p>
             <a:pPr lvl="0"/>
             <a:r>
-              <a:rPr lang="en-US" smtClean="0"/>
+              <a:rPr lang="en-US"/>
               <a:t>Click to edit Master text styles</a:t>
             </a:r>
           </a:p>
           <a:p>
             <a:pPr lvl="1"/>
             <a:r>
-              <a:rPr lang="en-US" smtClean="0"/>
+              <a:rPr lang="en-US"/>
               <a:t>Second level</a:t>
             </a:r>
           </a:p>
           <a:p>
             <a:pPr lvl="2"/>
             <a:r>
-              <a:rPr lang="en-US" smtClean="0"/>
+              <a:rPr lang="en-US"/>
               <a:t>Third level</a:t>
             </a:r>
           </a:p>
           <a:p>
             <a:pPr lvl="3"/>
             <a:r>
-              <a:rPr lang="en-US" smtClean="0"/>
+              <a:rPr lang="en-US"/>
               <a:t>Fourth level</a:t>
             </a:r>
           </a:p>
           <a:p>
             <a:pPr lvl="4"/>
             <a:r>
-              <a:rPr lang="en-US" smtClean="0"/>
+              <a:rPr lang="en-US"/>
               <a:t>Fifth level</a:t>
             </a:r>
-            <a:endParaRPr lang="en-US"/>
           </a:p>
         </p:txBody>
       </p:sp>
@@ -1193,38 +1184,37 @@
           <a:p>
             <a:pPr lvl="0"/>
             <a:r>
-              <a:rPr lang="en-US" smtClean="0"/>
+              <a:rPr lang="en-US"/>
               <a:t>Click to edit Master text styles</a:t>
             </a:r>
           </a:p>
           <a:p>
             <a:pPr lvl="1"/>
             <a:r>
-              <a:rPr lang="en-US" smtClean="0"/>
+              <a:rPr lang="en-US"/>
               <a:t>Second level</a:t>
             </a:r>
           </a:p>
           <a:p>
             <a:pPr lvl="2"/>
             <a:r>
-              <a:rPr lang="en-US" smtClean="0"/>
+              <a:rPr lang="en-US"/>
               <a:t>Third level</a:t>
             </a:r>
           </a:p>
           <a:p>
             <a:pPr lvl="3"/>
             <a:r>
-              <a:rPr lang="en-US" smtClean="0"/>
+              <a:rPr lang="en-US"/>
               <a:t>Fourth level</a:t>
             </a:r>
           </a:p>
           <a:p>
             <a:pPr lvl="4"/>
             <a:r>
-              <a:rPr lang="en-US" smtClean="0"/>
+              <a:rPr lang="en-US"/>
               <a:t>Fifth level</a:t>
             </a:r>
-            <a:endParaRPr lang="en-US"/>
           </a:p>
         </p:txBody>
       </p:sp>
@@ -1245,7 +1235,7 @@
           <a:p>
             <a:fld id="{D8862F2C-12C1-455F-815A-C164D68E1F7B}" type="datetimeFigureOut">
               <a:rPr lang="en-US" smtClean="0"/>
-              <a:t>2/11/2020</a:t>
+              <a:t>2/13/2020</a:t>
             </a:fld>
             <a:endParaRPr lang="en-US"/>
           </a:p>
@@ -1344,10 +1334,9 @@
           <a:lstStyle/>
           <a:p>
             <a:r>
-              <a:rPr lang="en-US" smtClean="0"/>
+              <a:rPr lang="en-US"/>
               <a:t>Click to edit Master title style</a:t>
             </a:r>
-            <a:endParaRPr lang="en-US"/>
           </a:p>
         </p:txBody>
       </p:sp>
@@ -1410,7 +1399,7 @@
           <a:p>
             <a:pPr lvl="0"/>
             <a:r>
-              <a:rPr lang="en-US" smtClean="0"/>
+              <a:rPr lang="en-US"/>
               <a:t>Click to edit Master text styles</a:t>
             </a:r>
           </a:p>
@@ -1438,38 +1427,37 @@
           <a:p>
             <a:pPr lvl="0"/>
             <a:r>
-              <a:rPr lang="en-US" smtClean="0"/>
+              <a:rPr lang="en-US"/>
               <a:t>Click to edit Master text styles</a:t>
             </a:r>
           </a:p>
           <a:p>
             <a:pPr lvl="1"/>
             <a:r>
-              <a:rPr lang="en-US" smtClean="0"/>
+              <a:rPr lang="en-US"/>
               <a:t>Second level</a:t>
             </a:r>
           </a:p>
           <a:p>
             <a:pPr lvl="2"/>
             <a:r>
-              <a:rPr lang="en-US" smtClean="0"/>
+              <a:rPr lang="en-US"/>
               <a:t>Third level</a:t>
             </a:r>
           </a:p>
           <a:p>
             <a:pPr lvl="3"/>
             <a:r>
-              <a:rPr lang="en-US" smtClean="0"/>
+              <a:rPr lang="en-US"/>
               <a:t>Fourth level</a:t>
             </a:r>
           </a:p>
           <a:p>
             <a:pPr lvl="4"/>
             <a:r>
-              <a:rPr lang="en-US" smtClean="0"/>
+              <a:rPr lang="en-US"/>
               <a:t>Fifth level</a:t>
             </a:r>
-            <a:endParaRPr lang="en-US"/>
           </a:p>
         </p:txBody>
       </p:sp>
@@ -1532,7 +1520,7 @@
           <a:p>
             <a:pPr lvl="0"/>
             <a:r>
-              <a:rPr lang="en-US" smtClean="0"/>
+              <a:rPr lang="en-US"/>
               <a:t>Click to edit Master text styles</a:t>
             </a:r>
           </a:p>
@@ -1560,38 +1548,37 @@
           <a:p>
             <a:pPr lvl="0"/>
             <a:r>
-              <a:rPr lang="en-US" smtClean="0"/>
+              <a:rPr lang="en-US"/>
               <a:t>Click to edit Master text styles</a:t>
             </a:r>
           </a:p>
           <a:p>
             <a:pPr lvl="1"/>
             <a:r>
-              <a:rPr lang="en-US" smtClean="0"/>
+              <a:rPr lang="en-US"/>
               <a:t>Second level</a:t>
             </a:r>
           </a:p>
           <a:p>
             <a:pPr lvl="2"/>
             <a:r>
-              <a:rPr lang="en-US" smtClean="0"/>
+              <a:rPr lang="en-US"/>
               <a:t>Third level</a:t>
             </a:r>
           </a:p>
           <a:p>
             <a:pPr lvl="3"/>
             <a:r>
-              <a:rPr lang="en-US" smtClean="0"/>
+              <a:rPr lang="en-US"/>
               <a:t>Fourth level</a:t>
             </a:r>
           </a:p>
           <a:p>
             <a:pPr lvl="4"/>
             <a:r>
-              <a:rPr lang="en-US" smtClean="0"/>
+              <a:rPr lang="en-US"/>
               <a:t>Fifth level</a:t>
             </a:r>
-            <a:endParaRPr lang="en-US"/>
           </a:p>
         </p:txBody>
       </p:sp>
@@ -1612,7 +1599,7 @@
           <a:p>
             <a:fld id="{D8862F2C-12C1-455F-815A-C164D68E1F7B}" type="datetimeFigureOut">
               <a:rPr lang="en-US" smtClean="0"/>
-              <a:t>2/11/2020</a:t>
+              <a:t>2/13/2020</a:t>
             </a:fld>
             <a:endParaRPr lang="en-US"/>
           </a:p>
@@ -1706,10 +1693,9 @@
           <a:lstStyle/>
           <a:p>
             <a:r>
-              <a:rPr lang="en-US" smtClean="0"/>
+              <a:rPr lang="en-US"/>
               <a:t>Click to edit Master title style</a:t>
             </a:r>
-            <a:endParaRPr lang="en-US"/>
           </a:p>
         </p:txBody>
       </p:sp>
@@ -1730,7 +1716,7 @@
           <a:p>
             <a:fld id="{D8862F2C-12C1-455F-815A-C164D68E1F7B}" type="datetimeFigureOut">
               <a:rPr lang="en-US" smtClean="0"/>
-              <a:t>2/11/2020</a:t>
+              <a:t>2/13/2020</a:t>
             </a:fld>
             <a:endParaRPr lang="en-US"/>
           </a:p>
@@ -1825,7 +1811,7 @@
           <a:p>
             <a:fld id="{D8862F2C-12C1-455F-815A-C164D68E1F7B}" type="datetimeFigureOut">
               <a:rPr lang="en-US" smtClean="0"/>
-              <a:t>2/11/2020</a:t>
+              <a:t>2/13/2020</a:t>
             </a:fld>
             <a:endParaRPr lang="en-US"/>
           </a:p>
@@ -1958,10 +1944,9 @@
           </a:lstStyle>
           <a:p>
             <a:r>
-              <a:rPr lang="en-US" smtClean="0"/>
+              <a:rPr lang="en-US"/>
               <a:t>Click to edit Master title style</a:t>
             </a:r>
-            <a:endParaRPr lang="en-US"/>
           </a:p>
         </p:txBody>
       </p:sp>
@@ -2015,38 +2000,37 @@
           <a:p>
             <a:pPr lvl="0"/>
             <a:r>
-              <a:rPr lang="en-US" smtClean="0"/>
+              <a:rPr lang="en-US"/>
               <a:t>Click to edit Master text styles</a:t>
             </a:r>
           </a:p>
           <a:p>
             <a:pPr lvl="1"/>
             <a:r>
-              <a:rPr lang="en-US" smtClean="0"/>
+              <a:rPr lang="en-US"/>
               <a:t>Second level</a:t>
             </a:r>
           </a:p>
           <a:p>
             <a:pPr lvl="2"/>
             <a:r>
-              <a:rPr lang="en-US" smtClean="0"/>
+              <a:rPr lang="en-US"/>
               <a:t>Third level</a:t>
             </a:r>
           </a:p>
           <a:p>
             <a:pPr lvl="3"/>
             <a:r>
-              <a:rPr lang="en-US" smtClean="0"/>
+              <a:rPr lang="en-US"/>
               <a:t>Fourth level</a:t>
             </a:r>
           </a:p>
           <a:p>
             <a:pPr lvl="4"/>
             <a:r>
-              <a:rPr lang="en-US" smtClean="0"/>
+              <a:rPr lang="en-US"/>
               <a:t>Fifth level</a:t>
             </a:r>
-            <a:endParaRPr lang="en-US"/>
           </a:p>
         </p:txBody>
       </p:sp>
@@ -2109,7 +2093,7 @@
           <a:p>
             <a:pPr lvl="0"/>
             <a:r>
-              <a:rPr lang="en-US" smtClean="0"/>
+              <a:rPr lang="en-US"/>
               <a:t>Click to edit Master text styles</a:t>
             </a:r>
           </a:p>
@@ -2132,7 +2116,7 @@
           <a:p>
             <a:fld id="{D8862F2C-12C1-455F-815A-C164D68E1F7B}" type="datetimeFigureOut">
               <a:rPr lang="en-US" smtClean="0"/>
-              <a:t>2/11/2020</a:t>
+              <a:t>2/13/2020</a:t>
             </a:fld>
             <a:endParaRPr lang="en-US"/>
           </a:p>
@@ -2235,10 +2219,9 @@
           </a:lstStyle>
           <a:p>
             <a:r>
-              <a:rPr lang="en-US" smtClean="0"/>
+              <a:rPr lang="en-US"/>
               <a:t>Click to edit Master title style</a:t>
             </a:r>
-            <a:endParaRPr lang="en-US"/>
           </a:p>
         </p:txBody>
       </p:sp>
@@ -2362,7 +2345,7 @@
           <a:p>
             <a:pPr lvl="0"/>
             <a:r>
-              <a:rPr lang="en-US" smtClean="0"/>
+              <a:rPr lang="en-US"/>
               <a:t>Click to edit Master text styles</a:t>
             </a:r>
           </a:p>
@@ -2385,7 +2368,7 @@
           <a:p>
             <a:fld id="{D8862F2C-12C1-455F-815A-C164D68E1F7B}" type="datetimeFigureOut">
               <a:rPr lang="en-US" smtClean="0"/>
-              <a:t>2/11/2020</a:t>
+              <a:t>2/13/2020</a:t>
             </a:fld>
             <a:endParaRPr lang="en-US"/>
           </a:p>
@@ -2494,10 +2477,9 @@
           <a:lstStyle/>
           <a:p>
             <a:r>
-              <a:rPr lang="en-US" smtClean="0"/>
+              <a:rPr lang="en-US"/>
               <a:t>Click to edit Master title style</a:t>
             </a:r>
-            <a:endParaRPr lang="en-US"/>
           </a:p>
         </p:txBody>
       </p:sp>
@@ -2528,38 +2510,37 @@
           <a:p>
             <a:pPr lvl="0"/>
             <a:r>
-              <a:rPr lang="en-US" smtClean="0"/>
+              <a:rPr lang="en-US"/>
               <a:t>Click to edit Master text styles</a:t>
             </a:r>
           </a:p>
           <a:p>
             <a:pPr lvl="1"/>
             <a:r>
-              <a:rPr lang="en-US" smtClean="0"/>
+              <a:rPr lang="en-US"/>
               <a:t>Second level</a:t>
             </a:r>
           </a:p>
           <a:p>
             <a:pPr lvl="2"/>
             <a:r>
-              <a:rPr lang="en-US" smtClean="0"/>
+              <a:rPr lang="en-US"/>
               <a:t>Third level</a:t>
             </a:r>
           </a:p>
           <a:p>
             <a:pPr lvl="3"/>
             <a:r>
-              <a:rPr lang="en-US" smtClean="0"/>
+              <a:rPr lang="en-US"/>
               <a:t>Fourth level</a:t>
             </a:r>
           </a:p>
           <a:p>
             <a:pPr lvl="4"/>
             <a:r>
-              <a:rPr lang="en-US" smtClean="0"/>
+              <a:rPr lang="en-US"/>
               <a:t>Fifth level</a:t>
             </a:r>
-            <a:endParaRPr lang="en-US"/>
           </a:p>
         </p:txBody>
       </p:sp>
@@ -2598,7 +2579,7 @@
           <a:p>
             <a:fld id="{D8862F2C-12C1-455F-815A-C164D68E1F7B}" type="datetimeFigureOut">
               <a:rPr lang="en-US" smtClean="0"/>
-              <a:t>2/11/2020</a:t>
+              <a:t>2/13/2020</a:t>
             </a:fld>
             <a:endParaRPr lang="en-US"/>
           </a:p>
@@ -3019,10 +3000,9 @@
           <a:lstStyle/>
           <a:p>
             <a:r>
-              <a:rPr lang="en-US" dirty="0" smtClean="0"/>
-              <a:t>Example Tour Mockup</a:t>
-            </a:r>
-            <a:endParaRPr lang="en-US" dirty="0"/>
+              <a:rPr lang="en-US" dirty="0"/>
+              <a:t>Meghana Tour Mockup</a:t>
+            </a:r>
           </a:p>
         </p:txBody>
       </p:sp>
@@ -3063,13 +3043,6 @@
       <p:transition spd="slow" advTm="3538"/>
     </mc:Fallback>
   </mc:AlternateContent>
-  <p:timing>
-    <p:tnLst>
-      <p:par>
-        <p:cTn id="1" dur="indefinite" restart="never" nodeType="tmRoot"/>
-      </p:par>
-    </p:tnLst>
-  </p:timing>
 </p:sld>
 </file>
 
@@ -3090,20 +3063,77 @@
           <a:chExt cx="0" cy="0"/>
         </a:xfrm>
       </p:grpSpPr>
-      <p:sp>
-        <p:nvSpPr>
-          <p:cNvPr id="4" name="Up Arrow Callout 3"/>
+      <p:pic>
+        <p:nvPicPr>
+          <p:cNvPr id="2" name="Picture 1">
+            <a:extLst>
+              <a:ext uri="{FF2B5EF4-FFF2-40B4-BE49-F238E27FC236}">
+                <a16:creationId xmlns:a16="http://schemas.microsoft.com/office/drawing/2014/main" id="{6E48F301-D28F-475A-AAB9-F474077E5A4C}"/>
+              </a:ext>
+            </a:extLst>
+          </p:cNvPr>
+          <p:cNvPicPr>
+            <a:picLocks noChangeAspect="1"/>
+          </p:cNvPicPr>
+          <p:nvPr/>
+        </p:nvPicPr>
+        <p:blipFill>
+          <a:blip r:embed="rId2"/>
+          <a:stretch>
+            <a:fillRect/>
+          </a:stretch>
+        </p:blipFill>
+        <p:spPr>
+          <a:xfrm>
+            <a:off x="0" y="-194554"/>
+            <a:ext cx="12192000" cy="7052553"/>
+          </a:xfrm>
+          <a:prstGeom prst="rect">
+            <a:avLst/>
+          </a:prstGeom>
+        </p:spPr>
+      </p:pic>
+      <p:sp>
+        <p:nvSpPr>
+          <p:cNvPr id="5" name="Arrow: Bent 4">
+            <a:extLst>
+              <a:ext uri="{FF2B5EF4-FFF2-40B4-BE49-F238E27FC236}">
+                <a16:creationId xmlns:a16="http://schemas.microsoft.com/office/drawing/2014/main" id="{D80DA1C2-2B7B-47B4-BFCE-2F2A83C1A82D}"/>
+              </a:ext>
+            </a:extLst>
+          </p:cNvPr>
           <p:cNvSpPr/>
           <p:nvPr/>
         </p:nvSpPr>
         <p:spPr>
-          <a:xfrm>
-            <a:off x="1079157" y="856736"/>
-            <a:ext cx="2825579" cy="2360598"/>
-          </a:xfrm>
-          <a:prstGeom prst="upArrowCallout">
+          <a:xfrm rot="10800000">
+            <a:off x="5665693" y="4007223"/>
+            <a:ext cx="1894927" cy="1636058"/>
+          </a:xfrm>
+          <a:prstGeom prst="bentArrow">
             <a:avLst/>
           </a:prstGeom>
+          <a:ln>
+            <a:noFill/>
+          </a:ln>
+          <a:effectLst>
+            <a:outerShdw blurRad="190500" dist="228600" dir="2700000" algn="ctr">
+              <a:srgbClr val="000000">
+                <a:alpha val="30000"/>
+              </a:srgbClr>
+            </a:outerShdw>
+          </a:effectLst>
+          <a:scene3d>
+            <a:camera prst="orthographicFront">
+              <a:rot lat="0" lon="0" rev="0"/>
+            </a:camera>
+            <a:lightRig rig="glow" dir="t">
+              <a:rot lat="0" lon="0" rev="4800000"/>
+            </a:lightRig>
+          </a:scene3d>
+          <a:sp3d prstMaterial="matte">
+            <a:bevelT w="127000" h="63500"/>
+          </a:sp3d>
         </p:spPr>
         <p:style>
           <a:lnRef idx="2">
@@ -3126,50 +3156,279 @@
           <a:lstStyle/>
           <a:p>
             <a:pPr algn="ctr"/>
-            <a:r>
-              <a:rPr lang="en-US" sz="2000" b="1" dirty="0" smtClean="0"/>
-              <a:t>Code tab</a:t>
-            </a:r>
-            <a:endParaRPr lang="en-US" b="1" dirty="0" smtClean="0"/>
-          </a:p>
-          <a:p>
-            <a:r>
-              <a:rPr lang="en-US" dirty="0" smtClean="0"/>
-              <a:t>Use </a:t>
-            </a:r>
-            <a:r>
-              <a:rPr lang="en-US" dirty="0" smtClean="0"/>
-              <a:t>the Code tab to browse the files in your repository</a:t>
-            </a:r>
-          </a:p>
-          <a:p>
-            <a:pPr algn="just" defTabSz="1087438"/>
-            <a:endParaRPr lang="en-US" sz="1200" dirty="0" smtClean="0">
+            <a:endParaRPr lang="en-US">
               <a:solidFill>
-                <a:schemeClr val="accent1">
-                  <a:lumMod val="60000"/>
-                  <a:lumOff val="40000"/>
-                </a:schemeClr>
+                <a:schemeClr val="tx1"/>
               </a:solidFill>
             </a:endParaRPr>
           </a:p>
-          <a:p>
-            <a:pPr algn="just" defTabSz="1171575"/>
-            <a:r>
-              <a:rPr lang="en-US" sz="1200" dirty="0" smtClean="0">
-                <a:solidFill>
-                  <a:schemeClr val="accent1">
-                    <a:lumMod val="60000"/>
-                    <a:lumOff val="40000"/>
-                  </a:schemeClr>
-                </a:solidFill>
-              </a:rPr>
-              <a:t>Back</a:t>
-            </a:r>
-            <a:r>
-              <a:rPr lang="en-US" sz="1200" dirty="0" smtClean="0"/>
-              <a:t>	Next	End</a:t>
-            </a:r>
+        </p:txBody>
+      </p:sp>
+      <p:sp>
+        <p:nvSpPr>
+          <p:cNvPr id="6" name="TextBox 5">
+            <a:extLst>
+              <a:ext uri="{FF2B5EF4-FFF2-40B4-BE49-F238E27FC236}">
+                <a16:creationId xmlns:a16="http://schemas.microsoft.com/office/drawing/2014/main" id="{A7A75898-4ACE-4D5C-94F5-641709E87467}"/>
+              </a:ext>
+            </a:extLst>
+          </p:cNvPr>
+          <p:cNvSpPr txBox="1"/>
+          <p:nvPr/>
+        </p:nvSpPr>
+        <p:spPr>
+          <a:xfrm>
+            <a:off x="5932719" y="2465748"/>
+            <a:ext cx="2638780" cy="1958786"/>
+          </a:xfrm>
+          <a:prstGeom prst="rect">
+            <a:avLst/>
+          </a:prstGeom>
+          <a:solidFill>
+            <a:srgbClr val="5B9BD5"/>
+          </a:solidFill>
+          <a:ln>
+            <a:noFill/>
+          </a:ln>
+          <a:effectLst>
+            <a:outerShdw blurRad="190500" dist="228600" dir="2700000" algn="ctr">
+              <a:srgbClr val="000000">
+                <a:alpha val="30000"/>
+              </a:srgbClr>
+            </a:outerShdw>
+          </a:effectLst>
+          <a:scene3d>
+            <a:camera prst="orthographicFront">
+              <a:rot lat="0" lon="0" rev="0"/>
+            </a:camera>
+            <a:lightRig rig="glow" dir="t">
+              <a:rot lat="0" lon="0" rev="4800000"/>
+            </a:lightRig>
+          </a:scene3d>
+          <a:sp3d prstMaterial="matte">
+            <a:bevelT w="127000" h="63500"/>
+          </a:sp3d>
+        </p:spPr>
+        <p:txBody>
+          <a:bodyPr wrap="square" rtlCol="0">
+            <a:spAutoFit/>
+          </a:bodyPr>
+          <a:lstStyle/>
+          <a:p>
+            <a:endParaRPr lang="en-US" dirty="0"/>
+          </a:p>
+        </p:txBody>
+      </p:sp>
+      <p:sp>
+        <p:nvSpPr>
+          <p:cNvPr id="7" name="TextBox 6">
+            <a:extLst>
+              <a:ext uri="{FF2B5EF4-FFF2-40B4-BE49-F238E27FC236}">
+                <a16:creationId xmlns:a16="http://schemas.microsoft.com/office/drawing/2014/main" id="{7B13B4C6-1769-4D35-904C-9E60D85A5AB3}"/>
+              </a:ext>
+            </a:extLst>
+          </p:cNvPr>
+          <p:cNvSpPr txBox="1"/>
+          <p:nvPr/>
+        </p:nvSpPr>
+        <p:spPr>
+          <a:xfrm>
+            <a:off x="6375483" y="2489048"/>
+            <a:ext cx="1721223" cy="461665"/>
+          </a:xfrm>
+          <a:prstGeom prst="rect">
+            <a:avLst/>
+          </a:prstGeom>
+          <a:noFill/>
+        </p:spPr>
+        <p:txBody>
+          <a:bodyPr wrap="square" rtlCol="0">
+            <a:spAutoFit/>
+          </a:bodyPr>
+          <a:lstStyle/>
+          <a:p>
+            <a:pPr algn="ctr"/>
+            <a:r>
+              <a:rPr lang="en-US" sz="2400" dirty="0"/>
+              <a:t>Artboard</a:t>
+            </a:r>
+          </a:p>
+        </p:txBody>
+      </p:sp>
+      <p:sp>
+        <p:nvSpPr>
+          <p:cNvPr id="10" name="TextBox 9">
+            <a:extLst>
+              <a:ext uri="{FF2B5EF4-FFF2-40B4-BE49-F238E27FC236}">
+                <a16:creationId xmlns:a16="http://schemas.microsoft.com/office/drawing/2014/main" id="{698E921A-0951-4A89-92BC-D799460E12A7}"/>
+              </a:ext>
+            </a:extLst>
+          </p:cNvPr>
+          <p:cNvSpPr txBox="1"/>
+          <p:nvPr/>
+        </p:nvSpPr>
+        <p:spPr>
+          <a:xfrm>
+            <a:off x="5916705" y="4151565"/>
+            <a:ext cx="562979" cy="276999"/>
+          </a:xfrm>
+          <a:prstGeom prst="rect">
+            <a:avLst/>
+          </a:prstGeom>
+          <a:noFill/>
+        </p:spPr>
+        <p:txBody>
+          <a:bodyPr wrap="square" rtlCol="0">
+            <a:spAutoFit/>
+          </a:bodyPr>
+          <a:lstStyle/>
+          <a:p>
+            <a:pPr algn="ctr"/>
+            <a:r>
+              <a:rPr lang="en-US" sz="1200" dirty="0"/>
+              <a:t>back</a:t>
+            </a:r>
+          </a:p>
+        </p:txBody>
+      </p:sp>
+      <p:sp>
+        <p:nvSpPr>
+          <p:cNvPr id="12" name="TextBox 11">
+            <a:extLst>
+              <a:ext uri="{FF2B5EF4-FFF2-40B4-BE49-F238E27FC236}">
+                <a16:creationId xmlns:a16="http://schemas.microsoft.com/office/drawing/2014/main" id="{33C0A0B9-17E7-46A6-9B2A-FDE9CE90BBEC}"/>
+              </a:ext>
+            </a:extLst>
+          </p:cNvPr>
+          <p:cNvSpPr txBox="1"/>
+          <p:nvPr/>
+        </p:nvSpPr>
+        <p:spPr>
+          <a:xfrm>
+            <a:off x="6970619" y="4147535"/>
+            <a:ext cx="562979" cy="276999"/>
+          </a:xfrm>
+          <a:prstGeom prst="rect">
+            <a:avLst/>
+          </a:prstGeom>
+          <a:noFill/>
+        </p:spPr>
+        <p:txBody>
+          <a:bodyPr wrap="square" rtlCol="0">
+            <a:spAutoFit/>
+          </a:bodyPr>
+          <a:lstStyle/>
+          <a:p>
+            <a:pPr algn="ctr"/>
+            <a:r>
+              <a:rPr lang="en-US" sz="1200" dirty="0"/>
+              <a:t>next</a:t>
+            </a:r>
+          </a:p>
+        </p:txBody>
+      </p:sp>
+      <p:sp>
+        <p:nvSpPr>
+          <p:cNvPr id="13" name="TextBox 12">
+            <a:extLst>
+              <a:ext uri="{FF2B5EF4-FFF2-40B4-BE49-F238E27FC236}">
+                <a16:creationId xmlns:a16="http://schemas.microsoft.com/office/drawing/2014/main" id="{5B910B29-BF06-41A8-9F17-53A6FC10A0BA}"/>
+              </a:ext>
+            </a:extLst>
+          </p:cNvPr>
+          <p:cNvSpPr txBox="1"/>
+          <p:nvPr/>
+        </p:nvSpPr>
+        <p:spPr>
+          <a:xfrm>
+            <a:off x="8051555" y="4147535"/>
+            <a:ext cx="420563" cy="276999"/>
+          </a:xfrm>
+          <a:prstGeom prst="rect">
+            <a:avLst/>
+          </a:prstGeom>
+          <a:noFill/>
+        </p:spPr>
+        <p:txBody>
+          <a:bodyPr wrap="square" rtlCol="0">
+            <a:spAutoFit/>
+          </a:bodyPr>
+          <a:lstStyle/>
+          <a:p>
+            <a:pPr algn="ctr"/>
+            <a:r>
+              <a:rPr lang="en-US" sz="1200" dirty="0"/>
+              <a:t>end</a:t>
+            </a:r>
+          </a:p>
+        </p:txBody>
+      </p:sp>
+      <p:sp>
+        <p:nvSpPr>
+          <p:cNvPr id="14" name="TextBox 13">
+            <a:extLst>
+              <a:ext uri="{FF2B5EF4-FFF2-40B4-BE49-F238E27FC236}">
+                <a16:creationId xmlns:a16="http://schemas.microsoft.com/office/drawing/2014/main" id="{61909474-2A9D-480F-92E6-4295E32DC202}"/>
+              </a:ext>
+            </a:extLst>
+          </p:cNvPr>
+          <p:cNvSpPr txBox="1"/>
+          <p:nvPr/>
+        </p:nvSpPr>
+        <p:spPr>
+          <a:xfrm>
+            <a:off x="5932719" y="2893984"/>
+            <a:ext cx="2638780" cy="1200329"/>
+          </a:xfrm>
+          <a:prstGeom prst="rect">
+            <a:avLst/>
+          </a:prstGeom>
+          <a:noFill/>
+        </p:spPr>
+        <p:txBody>
+          <a:bodyPr wrap="square" rtlCol="0">
+            <a:spAutoFit/>
+          </a:bodyPr>
+          <a:lstStyle/>
+          <a:p>
+            <a:r>
+              <a:rPr lang="en-US" sz="1200" dirty="0"/>
+              <a:t>You can start composing your creative ideas on the artboard. To create another artboard, click “</a:t>
+            </a:r>
+            <a:r>
+              <a:rPr lang="en-US" sz="1200" b="1" dirty="0"/>
+              <a:t>Window</a:t>
+            </a:r>
+            <a:r>
+              <a:rPr lang="en-US" sz="1200" dirty="0"/>
+              <a:t>” &gt; “</a:t>
+            </a:r>
+            <a:r>
+              <a:rPr lang="en-US" sz="1200" b="1" dirty="0"/>
+              <a:t>Artboard</a:t>
+            </a:r>
+            <a:r>
+              <a:rPr lang="en-US" sz="1200" dirty="0"/>
+              <a:t>” in the top menu bar.  </a:t>
+            </a:r>
+          </a:p>
+          <a:p>
+            <a:endParaRPr lang="en-US" sz="1200" dirty="0"/>
+          </a:p>
+          <a:p>
+            <a:r>
+              <a:rPr lang="en-US" sz="1200" dirty="0"/>
+              <a:t>Press </a:t>
+            </a:r>
+            <a:r>
+              <a:rPr lang="en-US" sz="1200" b="1" dirty="0"/>
+              <a:t>next </a:t>
+            </a:r>
+            <a:r>
+              <a:rPr lang="en-US" sz="1200" dirty="0"/>
+              <a:t>for more information.</a:t>
+            </a:r>
+            <a:endParaRPr lang="en-US" sz="1200" b="1" dirty="0"/>
           </a:p>
         </p:txBody>
       </p:sp>
@@ -3191,13 +3450,6 @@
       <p:transition spd="slow" advTm="4126"/>
     </mc:Fallback>
   </mc:AlternateContent>
-  <p:timing>
-    <p:tnLst>
-      <p:par>
-        <p:cTn id="1" dur="indefinite" restart="never" nodeType="tmRoot"/>
-      </p:par>
-    </p:tnLst>
-  </p:timing>
 </p:sld>
 </file>
 
@@ -3218,20 +3470,76 @@
           <a:chExt cx="0" cy="0"/>
         </a:xfrm>
       </p:grpSpPr>
-      <p:sp>
-        <p:nvSpPr>
-          <p:cNvPr id="2" name="Left Arrow Callout 1"/>
+      <p:pic>
+        <p:nvPicPr>
+          <p:cNvPr id="4" name="Picture 3">
+            <a:extLst>
+              <a:ext uri="{FF2B5EF4-FFF2-40B4-BE49-F238E27FC236}">
+                <a16:creationId xmlns:a16="http://schemas.microsoft.com/office/drawing/2014/main" id="{559C259F-B8F8-459C-8897-7944418C42EF}"/>
+              </a:ext>
+            </a:extLst>
+          </p:cNvPr>
+          <p:cNvPicPr>
+            <a:picLocks noChangeAspect="1"/>
+          </p:cNvPicPr>
+          <p:nvPr/>
+        </p:nvPicPr>
+        <p:blipFill rotWithShape="1">
+          <a:blip r:embed="rId2"/>
+          <a:srcRect b="4575"/>
+          <a:stretch/>
+        </p:blipFill>
+        <p:spPr>
+          <a:xfrm>
+            <a:off x="0" y="0"/>
+            <a:ext cx="12192000" cy="6858000"/>
+          </a:xfrm>
+          <a:prstGeom prst="rect">
+            <a:avLst/>
+          </a:prstGeom>
+        </p:spPr>
+      </p:pic>
+      <p:sp>
+        <p:nvSpPr>
+          <p:cNvPr id="5" name="Arrow: Bent 4">
+            <a:extLst>
+              <a:ext uri="{FF2B5EF4-FFF2-40B4-BE49-F238E27FC236}">
+                <a16:creationId xmlns:a16="http://schemas.microsoft.com/office/drawing/2014/main" id="{1EED692E-30CA-47A5-9AEC-9B1410951C9B}"/>
+              </a:ext>
+            </a:extLst>
+          </p:cNvPr>
           <p:cNvSpPr/>
           <p:nvPr/>
         </p:nvSpPr>
         <p:spPr>
           <a:xfrm>
-            <a:off x="3080951" y="2010033"/>
-            <a:ext cx="3772930" cy="1754659"/>
-          </a:xfrm>
-          <a:prstGeom prst="leftArrowCallout">
+            <a:off x="1681316" y="1633767"/>
+            <a:ext cx="1894927" cy="1636058"/>
+          </a:xfrm>
+          <a:prstGeom prst="bentArrow">
             <a:avLst/>
           </a:prstGeom>
+          <a:ln>
+            <a:noFill/>
+          </a:ln>
+          <a:effectLst>
+            <a:outerShdw blurRad="190500" dist="228600" dir="2700000" algn="ctr">
+              <a:srgbClr val="000000">
+                <a:alpha val="30000"/>
+              </a:srgbClr>
+            </a:outerShdw>
+          </a:effectLst>
+          <a:scene3d>
+            <a:camera prst="orthographicFront">
+              <a:rot lat="0" lon="0" rev="0"/>
+            </a:camera>
+            <a:lightRig rig="glow" dir="t">
+              <a:rot lat="0" lon="0" rev="4800000"/>
+            </a:lightRig>
+          </a:scene3d>
+          <a:sp3d prstMaterial="matte">
+            <a:bevelT w="127000" h="63500"/>
+          </a:sp3d>
         </p:spPr>
         <p:style>
           <a:lnRef idx="2">
@@ -3254,58 +3562,289 @@
           <a:lstStyle/>
           <a:p>
             <a:pPr algn="ctr"/>
-            <a:r>
-              <a:rPr lang="en-US" sz="2000" b="1" dirty="0" smtClean="0"/>
-              <a:t>Branch button</a:t>
-            </a:r>
-          </a:p>
-          <a:p>
-            <a:r>
-              <a:rPr lang="en-US" dirty="0" smtClean="0"/>
-              <a:t>Make </a:t>
-            </a:r>
-            <a:r>
-              <a:rPr lang="en-US" dirty="0" smtClean="0"/>
-              <a:t>sure you select the correct Branch (Winter2020)</a:t>
-            </a:r>
-          </a:p>
-          <a:p>
-            <a:pPr algn="just" defTabSz="855663"/>
-            <a:endParaRPr lang="en-US" sz="1400" dirty="0">
+            <a:endParaRPr lang="en-US">
               <a:solidFill>
-                <a:schemeClr val="accent1">
-                  <a:lumMod val="60000"/>
-                  <a:lumOff val="40000"/>
-                </a:schemeClr>
+                <a:schemeClr val="tx1"/>
               </a:solidFill>
             </a:endParaRPr>
           </a:p>
-          <a:p>
-            <a:pPr algn="just" defTabSz="973138"/>
-            <a:r>
-              <a:rPr lang="en-US" sz="1400" dirty="0">
-                <a:solidFill>
-                  <a:schemeClr val="bg1"/>
-                </a:solidFill>
-              </a:rPr>
-              <a:t>Back</a:t>
-            </a:r>
-            <a:r>
-              <a:rPr lang="en-US" sz="1400" dirty="0"/>
-              <a:t>	Next	</a:t>
-            </a:r>
-            <a:r>
-              <a:rPr lang="en-US" sz="1400" dirty="0" smtClean="0"/>
-              <a:t>End</a:t>
-            </a:r>
+        </p:txBody>
+      </p:sp>
+      <p:sp>
+        <p:nvSpPr>
+          <p:cNvPr id="6" name="TextBox 5">
+            <a:extLst>
+              <a:ext uri="{FF2B5EF4-FFF2-40B4-BE49-F238E27FC236}">
+                <a16:creationId xmlns:a16="http://schemas.microsoft.com/office/drawing/2014/main" id="{131B4E15-2A3E-4216-B6EC-AAB36C216CDF}"/>
+              </a:ext>
+            </a:extLst>
+          </p:cNvPr>
+          <p:cNvSpPr txBox="1"/>
+          <p:nvPr/>
+        </p:nvSpPr>
+        <p:spPr>
+          <a:xfrm>
+            <a:off x="742155" y="2833300"/>
+            <a:ext cx="2638780" cy="1958786"/>
+          </a:xfrm>
+          <a:prstGeom prst="rect">
+            <a:avLst/>
+          </a:prstGeom>
+          <a:solidFill>
+            <a:srgbClr val="5B9BD5"/>
+          </a:solidFill>
+          <a:ln>
+            <a:noFill/>
+          </a:ln>
+          <a:effectLst>
+            <a:outerShdw blurRad="190500" dist="228600" dir="2700000" algn="ctr">
+              <a:srgbClr val="000000">
+                <a:alpha val="30000"/>
+              </a:srgbClr>
+            </a:outerShdw>
+          </a:effectLst>
+          <a:scene3d>
+            <a:camera prst="orthographicFront">
+              <a:rot lat="0" lon="0" rev="0"/>
+            </a:camera>
+            <a:lightRig rig="glow" dir="t">
+              <a:rot lat="0" lon="0" rev="4800000"/>
+            </a:lightRig>
+          </a:scene3d>
+          <a:sp3d prstMaterial="matte">
+            <a:bevelT w="127000" h="63500"/>
+          </a:sp3d>
+        </p:spPr>
+        <p:txBody>
+          <a:bodyPr wrap="square" rtlCol="0">
+            <a:spAutoFit/>
+          </a:bodyPr>
+          <a:lstStyle/>
+          <a:p>
             <a:endParaRPr lang="en-US" dirty="0"/>
+          </a:p>
+        </p:txBody>
+      </p:sp>
+      <p:sp>
+        <p:nvSpPr>
+          <p:cNvPr id="7" name="TextBox 6">
+            <a:extLst>
+              <a:ext uri="{FF2B5EF4-FFF2-40B4-BE49-F238E27FC236}">
+                <a16:creationId xmlns:a16="http://schemas.microsoft.com/office/drawing/2014/main" id="{1B5D6486-FB1F-4DB8-A574-1CF8CCE023CD}"/>
+              </a:ext>
+            </a:extLst>
+          </p:cNvPr>
+          <p:cNvSpPr txBox="1"/>
+          <p:nvPr/>
+        </p:nvSpPr>
+        <p:spPr>
+          <a:xfrm>
+            <a:off x="1200933" y="2856600"/>
+            <a:ext cx="1721223" cy="461665"/>
+          </a:xfrm>
+          <a:prstGeom prst="rect">
+            <a:avLst/>
+          </a:prstGeom>
+          <a:noFill/>
+        </p:spPr>
+        <p:txBody>
+          <a:bodyPr wrap="square" rtlCol="0">
+            <a:spAutoFit/>
+          </a:bodyPr>
+          <a:lstStyle/>
+          <a:p>
+            <a:pPr algn="ctr"/>
+            <a:r>
+              <a:rPr lang="en-US" sz="2400" dirty="0"/>
+              <a:t>Artboards</a:t>
+            </a:r>
+          </a:p>
+        </p:txBody>
+      </p:sp>
+      <p:sp>
+        <p:nvSpPr>
+          <p:cNvPr id="8" name="TextBox 7">
+            <a:extLst>
+              <a:ext uri="{FF2B5EF4-FFF2-40B4-BE49-F238E27FC236}">
+                <a16:creationId xmlns:a16="http://schemas.microsoft.com/office/drawing/2014/main" id="{EE077395-2712-4A70-AE58-EAAB4DBAFB77}"/>
+              </a:ext>
+            </a:extLst>
+          </p:cNvPr>
+          <p:cNvSpPr txBox="1"/>
+          <p:nvPr/>
+        </p:nvSpPr>
+        <p:spPr>
+          <a:xfrm>
+            <a:off x="742155" y="4519117"/>
+            <a:ext cx="562979" cy="276999"/>
+          </a:xfrm>
+          <a:prstGeom prst="rect">
+            <a:avLst/>
+          </a:prstGeom>
+          <a:noFill/>
+        </p:spPr>
+        <p:txBody>
+          <a:bodyPr wrap="square" rtlCol="0">
+            <a:spAutoFit/>
+          </a:bodyPr>
+          <a:lstStyle/>
+          <a:p>
+            <a:pPr algn="ctr"/>
+            <a:r>
+              <a:rPr lang="en-US" sz="1200" dirty="0"/>
+              <a:t>back</a:t>
+            </a:r>
+          </a:p>
+        </p:txBody>
+      </p:sp>
+      <p:sp>
+        <p:nvSpPr>
+          <p:cNvPr id="9" name="TextBox 8">
+            <a:extLst>
+              <a:ext uri="{FF2B5EF4-FFF2-40B4-BE49-F238E27FC236}">
+                <a16:creationId xmlns:a16="http://schemas.microsoft.com/office/drawing/2014/main" id="{246B7D49-9E72-43D7-A7AB-2FFAC24736E9}"/>
+              </a:ext>
+            </a:extLst>
+          </p:cNvPr>
+          <p:cNvSpPr txBox="1"/>
+          <p:nvPr/>
+        </p:nvSpPr>
+        <p:spPr>
+          <a:xfrm>
+            <a:off x="1796069" y="4515087"/>
+            <a:ext cx="562979" cy="276999"/>
+          </a:xfrm>
+          <a:prstGeom prst="rect">
+            <a:avLst/>
+          </a:prstGeom>
+          <a:noFill/>
+        </p:spPr>
+        <p:txBody>
+          <a:bodyPr wrap="square" rtlCol="0">
+            <a:spAutoFit/>
+          </a:bodyPr>
+          <a:lstStyle/>
+          <a:p>
+            <a:pPr algn="ctr"/>
+            <a:r>
+              <a:rPr lang="en-US" sz="1200" dirty="0"/>
+              <a:t>next</a:t>
+            </a:r>
+          </a:p>
+        </p:txBody>
+      </p:sp>
+      <p:sp>
+        <p:nvSpPr>
+          <p:cNvPr id="10" name="TextBox 9">
+            <a:extLst>
+              <a:ext uri="{FF2B5EF4-FFF2-40B4-BE49-F238E27FC236}">
+                <a16:creationId xmlns:a16="http://schemas.microsoft.com/office/drawing/2014/main" id="{B9371F42-2550-48C3-859F-D9D1EB435196}"/>
+              </a:ext>
+            </a:extLst>
+          </p:cNvPr>
+          <p:cNvSpPr txBox="1"/>
+          <p:nvPr/>
+        </p:nvSpPr>
+        <p:spPr>
+          <a:xfrm>
+            <a:off x="2877005" y="4515087"/>
+            <a:ext cx="420563" cy="276999"/>
+          </a:xfrm>
+          <a:prstGeom prst="rect">
+            <a:avLst/>
+          </a:prstGeom>
+          <a:noFill/>
+        </p:spPr>
+        <p:txBody>
+          <a:bodyPr wrap="square" rtlCol="0">
+            <a:spAutoFit/>
+          </a:bodyPr>
+          <a:lstStyle/>
+          <a:p>
+            <a:pPr algn="ctr"/>
+            <a:r>
+              <a:rPr lang="en-US" sz="1200" dirty="0"/>
+              <a:t>end</a:t>
+            </a:r>
+          </a:p>
+        </p:txBody>
+      </p:sp>
+      <p:sp>
+        <p:nvSpPr>
+          <p:cNvPr id="11" name="TextBox 10">
+            <a:extLst>
+              <a:ext uri="{FF2B5EF4-FFF2-40B4-BE49-F238E27FC236}">
+                <a16:creationId xmlns:a16="http://schemas.microsoft.com/office/drawing/2014/main" id="{72E7BEDE-105A-4F1D-B7A1-96970E710621}"/>
+              </a:ext>
+            </a:extLst>
+          </p:cNvPr>
+          <p:cNvSpPr txBox="1"/>
+          <p:nvPr/>
+        </p:nvSpPr>
+        <p:spPr>
+          <a:xfrm>
+            <a:off x="758169" y="3318265"/>
+            <a:ext cx="2638780" cy="1015663"/>
+          </a:xfrm>
+          <a:prstGeom prst="rect">
+            <a:avLst/>
+          </a:prstGeom>
+          <a:noFill/>
+        </p:spPr>
+        <p:txBody>
+          <a:bodyPr wrap="square" rtlCol="0">
+            <a:spAutoFit/>
+          </a:bodyPr>
+          <a:lstStyle/>
+          <a:p>
+            <a:r>
+              <a:rPr lang="en-US" sz="1200" dirty="0"/>
+              <a:t>Click “</a:t>
+            </a:r>
+            <a:r>
+              <a:rPr lang="en-US" sz="1200" b="1" dirty="0"/>
+              <a:t>Artboards</a:t>
+            </a:r>
+            <a:r>
+              <a:rPr lang="en-US" sz="1200" dirty="0"/>
+              <a:t>” to enable the “</a:t>
+            </a:r>
+            <a:r>
+              <a:rPr lang="en-US" sz="1200" b="1" dirty="0"/>
+              <a:t>Artboards</a:t>
+            </a:r>
+            <a:r>
+              <a:rPr lang="en-US" sz="1200" dirty="0"/>
+              <a:t>” panel.</a:t>
+            </a:r>
+          </a:p>
+          <a:p>
+            <a:endParaRPr lang="en-US" sz="1200" dirty="0"/>
+          </a:p>
+          <a:p>
+            <a:endParaRPr lang="en-US" sz="1200" dirty="0"/>
+          </a:p>
+          <a:p>
+            <a:r>
+              <a:rPr lang="en-US" sz="1200" dirty="0"/>
+              <a:t>Press </a:t>
+            </a:r>
+            <a:r>
+              <a:rPr lang="en-US" sz="1200" b="1" dirty="0"/>
+              <a:t>next </a:t>
+            </a:r>
+            <a:r>
+              <a:rPr lang="en-US" sz="1200" dirty="0"/>
+              <a:t>for the next step.</a:t>
+            </a:r>
+            <a:endParaRPr lang="en-US" sz="1200" b="1" dirty="0"/>
           </a:p>
         </p:txBody>
       </p:sp>
     </p:spTree>
     <p:extLst>
       <p:ext uri="{BB962C8B-B14F-4D97-AF65-F5344CB8AC3E}">
-        <p14:creationId xmlns:p14="http://schemas.microsoft.com/office/powerpoint/2010/main" val="924229721"/>
+        <p14:creationId xmlns:p14="http://schemas.microsoft.com/office/powerpoint/2010/main" val="704957617"/>
       </p:ext>
     </p:extLst>
   </p:cSld>
@@ -3314,19 +3853,12 @@
   </p:clrMapOvr>
   <mc:AlternateContent xmlns:mc="http://schemas.openxmlformats.org/markup-compatibility/2006" xmlns:p14="http://schemas.microsoft.com/office/powerpoint/2010/main">
     <mc:Choice Requires="p14">
-      <p:transition spd="slow" p14:dur="2000" advTm="4190"/>
+      <p:transition spd="slow" p14:dur="2000" advTm="4126"/>
     </mc:Choice>
     <mc:Fallback xmlns="">
-      <p:transition spd="slow" advTm="4190"/>
+      <p:transition spd="slow" advTm="4126"/>
     </mc:Fallback>
   </mc:AlternateContent>
-  <p:timing>
-    <p:tnLst>
-      <p:par>
-        <p:cTn id="1" dur="indefinite" restart="never" nodeType="tmRoot"/>
-      </p:par>
-    </p:tnLst>
-  </p:timing>
 </p:sld>
 </file>
 
@@ -3347,20 +3879,100 @@
           <a:chExt cx="0" cy="0"/>
         </a:xfrm>
       </p:grpSpPr>
-      <p:sp>
-        <p:nvSpPr>
-          <p:cNvPr id="2" name="Right Arrow Callout 1"/>
+      <p:pic>
+        <p:nvPicPr>
+          <p:cNvPr id="2" name="Picture 1">
+            <a:extLst>
+              <a:ext uri="{FF2B5EF4-FFF2-40B4-BE49-F238E27FC236}">
+                <a16:creationId xmlns:a16="http://schemas.microsoft.com/office/drawing/2014/main" id="{6E48F301-D28F-475A-AAB9-F474077E5A4C}"/>
+              </a:ext>
+            </a:extLst>
+          </p:cNvPr>
+          <p:cNvPicPr>
+            <a:picLocks noChangeAspect="1"/>
+          </p:cNvPicPr>
+          <p:nvPr/>
+        </p:nvPicPr>
+        <p:blipFill>
+          <a:blip r:embed="rId2"/>
+          <a:stretch>
+            <a:fillRect/>
+          </a:stretch>
+        </p:blipFill>
+        <p:spPr>
+          <a:xfrm>
+            <a:off x="0" y="-194554"/>
+            <a:ext cx="12192000" cy="7052553"/>
+          </a:xfrm>
+          <a:prstGeom prst="rect">
+            <a:avLst/>
+          </a:prstGeom>
+        </p:spPr>
+      </p:pic>
+      <p:pic>
+        <p:nvPicPr>
+          <p:cNvPr id="3" name="Picture 2">
+            <a:extLst>
+              <a:ext uri="{FF2B5EF4-FFF2-40B4-BE49-F238E27FC236}">
+                <a16:creationId xmlns:a16="http://schemas.microsoft.com/office/drawing/2014/main" id="{DCA6D9CC-7DC3-42FE-93CC-DEEFD485C8BC}"/>
+              </a:ext>
+            </a:extLst>
+          </p:cNvPr>
+          <p:cNvPicPr>
+            <a:picLocks noChangeAspect="1"/>
+          </p:cNvPicPr>
+          <p:nvPr/>
+        </p:nvPicPr>
+        <p:blipFill rotWithShape="1">
+          <a:blip r:embed="rId3"/>
+          <a:srcRect b="4533"/>
+          <a:stretch/>
+        </p:blipFill>
+        <p:spPr>
+          <a:xfrm>
+            <a:off x="0" y="-194554"/>
+            <a:ext cx="12191999" cy="7052554"/>
+          </a:xfrm>
+          <a:prstGeom prst="rect">
+            <a:avLst/>
+          </a:prstGeom>
+        </p:spPr>
+      </p:pic>
+      <p:sp>
+        <p:nvSpPr>
+          <p:cNvPr id="11" name="Arrow: Down 10">
+            <a:extLst>
+              <a:ext uri="{FF2B5EF4-FFF2-40B4-BE49-F238E27FC236}">
+                <a16:creationId xmlns:a16="http://schemas.microsoft.com/office/drawing/2014/main" id="{E888E790-CD92-4843-9236-4B8AB98CC587}"/>
+              </a:ext>
+            </a:extLst>
+          </p:cNvPr>
           <p:cNvSpPr/>
           <p:nvPr/>
         </p:nvSpPr>
         <p:spPr>
           <a:xfrm>
-            <a:off x="5342468" y="2048933"/>
-            <a:ext cx="3579112" cy="1704089"/>
-          </a:xfrm>
-          <a:prstGeom prst="rightArrowCallout">
+            <a:off x="8640422" y="1347425"/>
+            <a:ext cx="950259" cy="1918447"/>
+          </a:xfrm>
+          <a:prstGeom prst="downArrow">
             <a:avLst/>
           </a:prstGeom>
+          <a:ln>
+            <a:noFill/>
+          </a:ln>
+          <a:effectLst/>
+          <a:scene3d>
+            <a:camera prst="orthographicFront">
+              <a:rot lat="0" lon="0" rev="0"/>
+            </a:camera>
+            <a:lightRig rig="contrasting" dir="t">
+              <a:rot lat="0" lon="0" rev="7800000"/>
+            </a:lightRig>
+          </a:scene3d>
+          <a:sp3d>
+            <a:bevelT w="139700" h="139700"/>
+          </a:sp3d>
         </p:spPr>
         <p:style>
           <a:lnRef idx="2">
@@ -3383,58 +3995,351 @@
           <a:lstStyle/>
           <a:p>
             <a:pPr algn="ctr"/>
-            <a:r>
-              <a:rPr lang="en-US" sz="2000" b="1" dirty="0" smtClean="0"/>
-              <a:t>Clone button</a:t>
-            </a:r>
-          </a:p>
-          <a:p>
-            <a:r>
-              <a:rPr lang="en-US" dirty="0" smtClean="0"/>
-              <a:t>Click </a:t>
-            </a:r>
-            <a:r>
-              <a:rPr lang="en-US" dirty="0" smtClean="0"/>
-              <a:t>here to get the URL you need to clone the repository locally</a:t>
-            </a:r>
-          </a:p>
-          <a:p>
-            <a:pPr algn="just"/>
-            <a:endParaRPr lang="en-US" sz="1400" dirty="0">
-              <a:solidFill>
-                <a:schemeClr val="accent1">
-                  <a:lumMod val="60000"/>
-                  <a:lumOff val="40000"/>
-                </a:schemeClr>
-              </a:solidFill>
-            </a:endParaRPr>
-          </a:p>
-          <a:p>
-            <a:pPr algn="just"/>
-            <a:r>
-              <a:rPr lang="en-US" sz="1400" dirty="0">
-                <a:solidFill>
-                  <a:schemeClr val="bg1"/>
-                </a:solidFill>
-              </a:rPr>
-              <a:t>Back</a:t>
-            </a:r>
-            <a:r>
-              <a:rPr lang="en-US" sz="1400" dirty="0"/>
-              <a:t>	Next	</a:t>
-            </a:r>
-            <a:r>
-              <a:rPr lang="en-US" sz="1400" dirty="0" smtClean="0"/>
-              <a:t>End</a:t>
-            </a:r>
-            <a:endParaRPr lang="en-US" sz="1400" dirty="0"/>
+            <a:endParaRPr lang="en-US"/>
+          </a:p>
+        </p:txBody>
+      </p:sp>
+      <p:sp>
+        <p:nvSpPr>
+          <p:cNvPr id="12" name="Arrow: Down 11">
+            <a:extLst>
+              <a:ext uri="{FF2B5EF4-FFF2-40B4-BE49-F238E27FC236}">
+                <a16:creationId xmlns:a16="http://schemas.microsoft.com/office/drawing/2014/main" id="{6441B6CF-9113-4E1E-A76D-0DDC092EB1A5}"/>
+              </a:ext>
+            </a:extLst>
+          </p:cNvPr>
+          <p:cNvSpPr/>
+          <p:nvPr/>
+        </p:nvSpPr>
+        <p:spPr>
+          <a:xfrm rot="5400000">
+            <a:off x="6826511" y="916201"/>
+            <a:ext cx="950259" cy="1918447"/>
+          </a:xfrm>
+          <a:prstGeom prst="downArrow">
+            <a:avLst/>
+          </a:prstGeom>
+          <a:ln>
+            <a:noFill/>
+          </a:ln>
+          <a:effectLst/>
+          <a:scene3d>
+            <a:camera prst="orthographicFront">
+              <a:rot lat="0" lon="0" rev="0"/>
+            </a:camera>
+            <a:lightRig rig="contrasting" dir="t">
+              <a:rot lat="0" lon="0" rev="7800000"/>
+            </a:lightRig>
+          </a:scene3d>
+          <a:sp3d>
+            <a:bevelT w="139700" h="139700"/>
+          </a:sp3d>
+        </p:spPr>
+        <p:style>
+          <a:lnRef idx="2">
+            <a:schemeClr val="accent1">
+              <a:shade val="50000"/>
+            </a:schemeClr>
+          </a:lnRef>
+          <a:fillRef idx="1">
+            <a:schemeClr val="accent1"/>
+          </a:fillRef>
+          <a:effectRef idx="0">
+            <a:schemeClr val="accent1"/>
+          </a:effectRef>
+          <a:fontRef idx="minor">
+            <a:schemeClr val="lt1"/>
+          </a:fontRef>
+        </p:style>
+        <p:txBody>
+          <a:bodyPr rtlCol="0" anchor="ctr"/>
+          <a:lstStyle/>
+          <a:p>
+            <a:pPr algn="ctr"/>
+            <a:endParaRPr lang="en-US"/>
+          </a:p>
+        </p:txBody>
+      </p:sp>
+      <p:sp>
+        <p:nvSpPr>
+          <p:cNvPr id="5" name="TextBox 4">
+            <a:extLst>
+              <a:ext uri="{FF2B5EF4-FFF2-40B4-BE49-F238E27FC236}">
+                <a16:creationId xmlns:a16="http://schemas.microsoft.com/office/drawing/2014/main" id="{F3E765C3-2034-4021-BA1F-6ECED1DB829B}"/>
+              </a:ext>
+            </a:extLst>
+          </p:cNvPr>
+          <p:cNvSpPr txBox="1"/>
+          <p:nvPr/>
+        </p:nvSpPr>
+        <p:spPr>
+          <a:xfrm>
+            <a:off x="7564296" y="296311"/>
+            <a:ext cx="2638780" cy="1958786"/>
+          </a:xfrm>
+          <a:prstGeom prst="rect">
+            <a:avLst/>
+          </a:prstGeom>
+          <a:solidFill>
+            <a:srgbClr val="5B9BD5"/>
+          </a:solidFill>
+          <a:ln>
+            <a:noFill/>
+          </a:ln>
+          <a:effectLst>
+            <a:outerShdw blurRad="190500" dist="228600" dir="2700000" algn="ctr">
+              <a:srgbClr val="000000">
+                <a:alpha val="30000"/>
+              </a:srgbClr>
+            </a:outerShdw>
+          </a:effectLst>
+          <a:scene3d>
+            <a:camera prst="orthographicFront">
+              <a:rot lat="0" lon="0" rev="0"/>
+            </a:camera>
+            <a:lightRig rig="glow" dir="t">
+              <a:rot lat="0" lon="0" rev="4800000"/>
+            </a:lightRig>
+          </a:scene3d>
+          <a:sp3d prstMaterial="matte">
+            <a:bevelT w="127000" h="63500"/>
+          </a:sp3d>
+        </p:spPr>
+        <p:txBody>
+          <a:bodyPr wrap="square" rtlCol="0">
+            <a:spAutoFit/>
+          </a:bodyPr>
+          <a:lstStyle/>
+          <a:p>
+            <a:endParaRPr lang="en-US" dirty="0"/>
+          </a:p>
+        </p:txBody>
+      </p:sp>
+      <p:sp>
+        <p:nvSpPr>
+          <p:cNvPr id="6" name="TextBox 5">
+            <a:extLst>
+              <a:ext uri="{FF2B5EF4-FFF2-40B4-BE49-F238E27FC236}">
+                <a16:creationId xmlns:a16="http://schemas.microsoft.com/office/drawing/2014/main" id="{C5343C4B-0F29-4089-8C56-4910DA2C8345}"/>
+              </a:ext>
+            </a:extLst>
+          </p:cNvPr>
+          <p:cNvSpPr txBox="1"/>
+          <p:nvPr/>
+        </p:nvSpPr>
+        <p:spPr>
+          <a:xfrm>
+            <a:off x="8023074" y="319611"/>
+            <a:ext cx="1721223" cy="461665"/>
+          </a:xfrm>
+          <a:prstGeom prst="rect">
+            <a:avLst/>
+          </a:prstGeom>
+          <a:noFill/>
+        </p:spPr>
+        <p:txBody>
+          <a:bodyPr wrap="square" rtlCol="0">
+            <a:spAutoFit/>
+          </a:bodyPr>
+          <a:lstStyle/>
+          <a:p>
+            <a:pPr algn="ctr"/>
+            <a:r>
+              <a:rPr lang="en-US" sz="2400" dirty="0"/>
+              <a:t>Artboards</a:t>
+            </a:r>
+          </a:p>
+        </p:txBody>
+      </p:sp>
+      <p:sp>
+        <p:nvSpPr>
+          <p:cNvPr id="7" name="TextBox 6">
+            <a:extLst>
+              <a:ext uri="{FF2B5EF4-FFF2-40B4-BE49-F238E27FC236}">
+                <a16:creationId xmlns:a16="http://schemas.microsoft.com/office/drawing/2014/main" id="{661F3F72-2C73-457F-A4CD-75571007EF48}"/>
+              </a:ext>
+            </a:extLst>
+          </p:cNvPr>
+          <p:cNvSpPr txBox="1"/>
+          <p:nvPr/>
+        </p:nvSpPr>
+        <p:spPr>
+          <a:xfrm>
+            <a:off x="7564296" y="1982128"/>
+            <a:ext cx="562979" cy="276999"/>
+          </a:xfrm>
+          <a:prstGeom prst="rect">
+            <a:avLst/>
+          </a:prstGeom>
+          <a:noFill/>
+        </p:spPr>
+        <p:txBody>
+          <a:bodyPr wrap="square" rtlCol="0">
+            <a:spAutoFit/>
+          </a:bodyPr>
+          <a:lstStyle/>
+          <a:p>
+            <a:pPr algn="ctr"/>
+            <a:r>
+              <a:rPr lang="en-US" sz="1200" dirty="0"/>
+              <a:t>back</a:t>
+            </a:r>
+          </a:p>
+        </p:txBody>
+      </p:sp>
+      <p:sp>
+        <p:nvSpPr>
+          <p:cNvPr id="8" name="TextBox 7">
+            <a:extLst>
+              <a:ext uri="{FF2B5EF4-FFF2-40B4-BE49-F238E27FC236}">
+                <a16:creationId xmlns:a16="http://schemas.microsoft.com/office/drawing/2014/main" id="{C5B19104-1209-4259-A032-6DCAE823EB82}"/>
+              </a:ext>
+            </a:extLst>
+          </p:cNvPr>
+          <p:cNvSpPr txBox="1"/>
+          <p:nvPr/>
+        </p:nvSpPr>
+        <p:spPr>
+          <a:xfrm>
+            <a:off x="8618210" y="1978098"/>
+            <a:ext cx="562979" cy="276999"/>
+          </a:xfrm>
+          <a:prstGeom prst="rect">
+            <a:avLst/>
+          </a:prstGeom>
+          <a:noFill/>
+        </p:spPr>
+        <p:txBody>
+          <a:bodyPr wrap="square" rtlCol="0">
+            <a:spAutoFit/>
+          </a:bodyPr>
+          <a:lstStyle/>
+          <a:p>
+            <a:pPr algn="ctr"/>
+            <a:r>
+              <a:rPr lang="en-US" sz="1200" dirty="0"/>
+              <a:t>next</a:t>
+            </a:r>
+          </a:p>
+        </p:txBody>
+      </p:sp>
+      <p:sp>
+        <p:nvSpPr>
+          <p:cNvPr id="9" name="TextBox 8">
+            <a:extLst>
+              <a:ext uri="{FF2B5EF4-FFF2-40B4-BE49-F238E27FC236}">
+                <a16:creationId xmlns:a16="http://schemas.microsoft.com/office/drawing/2014/main" id="{1E5B18EC-BF48-4D6C-B81B-D384193AD465}"/>
+              </a:ext>
+            </a:extLst>
+          </p:cNvPr>
+          <p:cNvSpPr txBox="1"/>
+          <p:nvPr/>
+        </p:nvSpPr>
+        <p:spPr>
+          <a:xfrm>
+            <a:off x="9699146" y="1978098"/>
+            <a:ext cx="420563" cy="276999"/>
+          </a:xfrm>
+          <a:prstGeom prst="rect">
+            <a:avLst/>
+          </a:prstGeom>
+          <a:noFill/>
+        </p:spPr>
+        <p:txBody>
+          <a:bodyPr wrap="square" rtlCol="0">
+            <a:spAutoFit/>
+          </a:bodyPr>
+          <a:lstStyle/>
+          <a:p>
+            <a:pPr algn="ctr"/>
+            <a:r>
+              <a:rPr lang="en-US" sz="1200" dirty="0"/>
+              <a:t>end</a:t>
+            </a:r>
+          </a:p>
+        </p:txBody>
+      </p:sp>
+      <p:sp>
+        <p:nvSpPr>
+          <p:cNvPr id="10" name="TextBox 9">
+            <a:extLst>
+              <a:ext uri="{FF2B5EF4-FFF2-40B4-BE49-F238E27FC236}">
+                <a16:creationId xmlns:a16="http://schemas.microsoft.com/office/drawing/2014/main" id="{A0047CE3-2392-4A91-A6C4-3A33AC5006D0}"/>
+              </a:ext>
+            </a:extLst>
+          </p:cNvPr>
+          <p:cNvSpPr txBox="1"/>
+          <p:nvPr/>
+        </p:nvSpPr>
+        <p:spPr>
+          <a:xfrm>
+            <a:off x="7580310" y="781276"/>
+            <a:ext cx="2638780" cy="1015663"/>
+          </a:xfrm>
+          <a:prstGeom prst="rect">
+            <a:avLst/>
+          </a:prstGeom>
+          <a:noFill/>
+        </p:spPr>
+        <p:txBody>
+          <a:bodyPr wrap="square" rtlCol="0">
+            <a:spAutoFit/>
+          </a:bodyPr>
+          <a:lstStyle/>
+          <a:p>
+            <a:r>
+              <a:rPr lang="en-US" sz="1200" dirty="0"/>
+              <a:t>Clicking “</a:t>
+            </a:r>
+            <a:r>
+              <a:rPr lang="en-US" sz="1200" b="1" dirty="0"/>
+              <a:t>Artboards</a:t>
+            </a:r>
+            <a:r>
+              <a:rPr lang="en-US" sz="1200" dirty="0"/>
+              <a:t>” in the “</a:t>
+            </a:r>
+            <a:r>
+              <a:rPr lang="en-US" sz="1200" b="1" dirty="0"/>
+              <a:t>Window</a:t>
+            </a:r>
+            <a:r>
+              <a:rPr lang="en-US" sz="1200" dirty="0"/>
+              <a:t>” dropdown enables the </a:t>
+            </a:r>
+            <a:r>
+              <a:rPr lang="en-US" sz="1200" b="1" dirty="0"/>
+              <a:t>“Artboards”</a:t>
+            </a:r>
+            <a:r>
+              <a:rPr lang="en-US" sz="1200" dirty="0"/>
+              <a:t> panel below. </a:t>
+            </a:r>
+          </a:p>
+          <a:p>
+            <a:endParaRPr lang="en-US" sz="1200" dirty="0"/>
+          </a:p>
+          <a:p>
+            <a:r>
+              <a:rPr lang="en-US" sz="1200" dirty="0"/>
+              <a:t>Press </a:t>
+            </a:r>
+            <a:r>
+              <a:rPr lang="en-US" sz="1200" b="1" dirty="0"/>
+              <a:t>next </a:t>
+            </a:r>
+            <a:r>
+              <a:rPr lang="en-US" sz="1200" dirty="0"/>
+              <a:t>for the next step.</a:t>
+            </a:r>
+            <a:endParaRPr lang="en-US" sz="1200" b="1" dirty="0"/>
           </a:p>
         </p:txBody>
       </p:sp>
     </p:spTree>
     <p:extLst>
       <p:ext uri="{BB962C8B-B14F-4D97-AF65-F5344CB8AC3E}">
-        <p14:creationId xmlns:p14="http://schemas.microsoft.com/office/powerpoint/2010/main" val="1498899676"/>
+        <p14:creationId xmlns:p14="http://schemas.microsoft.com/office/powerpoint/2010/main" val="674248647"/>
       </p:ext>
     </p:extLst>
   </p:cSld>
@@ -3443,19 +4348,12 @@
   </p:clrMapOvr>
   <mc:AlternateContent xmlns:mc="http://schemas.openxmlformats.org/markup-compatibility/2006" xmlns:p14="http://schemas.microsoft.com/office/powerpoint/2010/main">
     <mc:Choice Requires="p14">
-      <p:transition spd="slow" p14:dur="2000" advTm="3681"/>
+      <p:transition spd="slow" p14:dur="2000" advTm="4126"/>
     </mc:Choice>
     <mc:Fallback xmlns="">
-      <p:transition spd="slow" advTm="3681"/>
+      <p:transition spd="slow" advTm="4126"/>
     </mc:Fallback>
   </mc:AlternateContent>
-  <p:timing>
-    <p:tnLst>
-      <p:par>
-        <p:cTn id="1" dur="indefinite" restart="never" nodeType="tmRoot"/>
-      </p:par>
-    </p:tnLst>
-  </p:timing>
 </p:sld>
 </file>
 
@@ -3476,114 +4374,40 @@
           <a:chExt cx="0" cy="0"/>
         </a:xfrm>
       </p:grpSpPr>
-      <p:sp>
-        <p:nvSpPr>
-          <p:cNvPr id="2" name="Up Arrow Callout 1"/>
-          <p:cNvSpPr/>
+      <p:pic>
+        <p:nvPicPr>
+          <p:cNvPr id="2" name="Picture 1">
+            <a:extLst>
+              <a:ext uri="{FF2B5EF4-FFF2-40B4-BE49-F238E27FC236}">
+                <a16:creationId xmlns:a16="http://schemas.microsoft.com/office/drawing/2014/main" id="{6E48F301-D28F-475A-AAB9-F474077E5A4C}"/>
+              </a:ext>
+            </a:extLst>
+          </p:cNvPr>
+          <p:cNvPicPr>
+            <a:picLocks noChangeAspect="1"/>
+          </p:cNvPicPr>
           <p:nvPr/>
-        </p:nvSpPr>
-        <p:spPr>
-          <a:xfrm>
-            <a:off x="3262184" y="1878227"/>
-            <a:ext cx="2561968" cy="2575240"/>
-          </a:xfrm>
-          <a:prstGeom prst="upArrowCallout">
-            <a:avLst>
-              <a:gd name="adj1" fmla="val 20373"/>
-              <a:gd name="adj2" fmla="val 25000"/>
-              <a:gd name="adj3" fmla="val 19051"/>
-              <a:gd name="adj4" fmla="val 64977"/>
-            </a:avLst>
+        </p:nvPicPr>
+        <p:blipFill>
+          <a:blip r:embed="rId2"/>
+          <a:stretch>
+            <a:fillRect/>
+          </a:stretch>
+        </p:blipFill>
+        <p:spPr>
+          <a:xfrm>
+            <a:off x="0" y="-194554"/>
+            <a:ext cx="12192000" cy="7052553"/>
+          </a:xfrm>
+          <a:prstGeom prst="rect">
+            <a:avLst/>
           </a:prstGeom>
         </p:spPr>
-        <p:style>
-          <a:lnRef idx="2">
-            <a:schemeClr val="accent1">
-              <a:shade val="50000"/>
-            </a:schemeClr>
-          </a:lnRef>
-          <a:fillRef idx="1">
-            <a:schemeClr val="accent1"/>
-          </a:fillRef>
-          <a:effectRef idx="0">
-            <a:schemeClr val="accent1"/>
-          </a:effectRef>
-          <a:fontRef idx="minor">
-            <a:schemeClr val="lt1"/>
-          </a:fontRef>
-        </p:style>
-        <p:txBody>
-          <a:bodyPr rtlCol="0" anchor="ctr"/>
-          <a:lstStyle/>
-          <a:p>
-            <a:pPr algn="ctr"/>
-            <a:r>
-              <a:rPr lang="en-US" sz="2000" b="1" dirty="0" smtClean="0"/>
-              <a:t>Branch tab</a:t>
-            </a:r>
-          </a:p>
-          <a:p>
-            <a:r>
-              <a:rPr lang="en-US" dirty="0" smtClean="0"/>
-              <a:t>You </a:t>
-            </a:r>
-            <a:r>
-              <a:rPr lang="en-US" dirty="0" smtClean="0"/>
-              <a:t>can see all the branches in this repository</a:t>
-            </a:r>
-          </a:p>
-          <a:p>
-            <a:pPr algn="just" defTabSz="855663"/>
-            <a:endParaRPr lang="en-US" sz="1400" dirty="0">
-              <a:solidFill>
-                <a:schemeClr val="accent1">
-                  <a:lumMod val="60000"/>
-                  <a:lumOff val="40000"/>
-                </a:schemeClr>
-              </a:solidFill>
-            </a:endParaRPr>
-          </a:p>
-          <a:p>
-            <a:pPr algn="just" defTabSz="973138"/>
-            <a:r>
-              <a:rPr lang="en-US" sz="1400" dirty="0">
-                <a:solidFill>
-                  <a:schemeClr val="bg1"/>
-                </a:solidFill>
-              </a:rPr>
-              <a:t>Back</a:t>
-            </a:r>
-            <a:r>
-              <a:rPr lang="en-US" sz="1400" dirty="0"/>
-              <a:t>	</a:t>
-            </a:r>
-            <a:r>
-              <a:rPr lang="en-US" sz="1400" dirty="0">
-                <a:solidFill>
-                  <a:schemeClr val="accent1">
-                    <a:lumMod val="60000"/>
-                    <a:lumOff val="40000"/>
-                  </a:schemeClr>
-                </a:solidFill>
-              </a:rPr>
-              <a:t>Next</a:t>
-            </a:r>
-            <a:r>
-              <a:rPr lang="en-US" sz="1400" dirty="0"/>
-              <a:t>	</a:t>
-            </a:r>
-            <a:r>
-              <a:rPr lang="en-US" sz="1400" dirty="0" smtClean="0"/>
-              <a:t>End</a:t>
-            </a:r>
-            <a:endParaRPr lang="en-US" sz="1400" dirty="0"/>
-          </a:p>
-        </p:txBody>
-      </p:sp>
+      </p:pic>
     </p:spTree>
     <p:extLst>
       <p:ext uri="{BB962C8B-B14F-4D97-AF65-F5344CB8AC3E}">
-        <p14:creationId xmlns:p14="http://schemas.microsoft.com/office/powerpoint/2010/main" val="1173888677"/>
+        <p14:creationId xmlns:p14="http://schemas.microsoft.com/office/powerpoint/2010/main" val="4228013355"/>
       </p:ext>
     </p:extLst>
   </p:cSld>
@@ -3592,19 +4416,148 @@
   </p:clrMapOvr>
   <mc:AlternateContent xmlns:mc="http://schemas.openxmlformats.org/markup-compatibility/2006" xmlns:p14="http://schemas.microsoft.com/office/powerpoint/2010/main">
     <mc:Choice Requires="p14">
-      <p:transition spd="slow" p14:dur="2000" advTm="4819"/>
+      <p:transition spd="slow" p14:dur="2000" advTm="4126"/>
     </mc:Choice>
     <mc:Fallback xmlns="">
-      <p:transition spd="slow" advTm="4819"/>
+      <p:transition spd="slow" advTm="4126"/>
     </mc:Fallback>
   </mc:AlternateContent>
-  <p:timing>
-    <p:tnLst>
-      <p:par>
-        <p:cTn id="1" dur="indefinite" restart="never" nodeType="tmRoot"/>
-      </p:par>
-    </p:tnLst>
-  </p:timing>
+</p:sld>
+</file>
+
+<file path=ppt/slides/slide6.xml><?xml version="1.0" encoding="utf-8"?>
+<p:sld xmlns:a="http://schemas.openxmlformats.org/drawingml/2006/main" xmlns:r="http://schemas.openxmlformats.org/officeDocument/2006/relationships" xmlns:p="http://schemas.openxmlformats.org/presentationml/2006/main">
+  <p:cSld>
+    <p:spTree>
+      <p:nvGrpSpPr>
+        <p:cNvPr id="1" name=""/>
+        <p:cNvGrpSpPr/>
+        <p:nvPr/>
+      </p:nvGrpSpPr>
+      <p:grpSpPr>
+        <a:xfrm>
+          <a:off x="0" y="0"/>
+          <a:ext cx="0" cy="0"/>
+          <a:chOff x="0" y="0"/>
+          <a:chExt cx="0" cy="0"/>
+        </a:xfrm>
+      </p:grpSpPr>
+      <p:pic>
+        <p:nvPicPr>
+          <p:cNvPr id="2" name="Picture 1">
+            <a:extLst>
+              <a:ext uri="{FF2B5EF4-FFF2-40B4-BE49-F238E27FC236}">
+                <a16:creationId xmlns:a16="http://schemas.microsoft.com/office/drawing/2014/main" id="{6E48F301-D28F-475A-AAB9-F474077E5A4C}"/>
+              </a:ext>
+            </a:extLst>
+          </p:cNvPr>
+          <p:cNvPicPr>
+            <a:picLocks noChangeAspect="1"/>
+          </p:cNvPicPr>
+          <p:nvPr/>
+        </p:nvPicPr>
+        <p:blipFill>
+          <a:blip r:embed="rId2"/>
+          <a:stretch>
+            <a:fillRect/>
+          </a:stretch>
+        </p:blipFill>
+        <p:spPr>
+          <a:xfrm>
+            <a:off x="0" y="-194554"/>
+            <a:ext cx="12192000" cy="7052553"/>
+          </a:xfrm>
+          <a:prstGeom prst="rect">
+            <a:avLst/>
+          </a:prstGeom>
+        </p:spPr>
+      </p:pic>
+    </p:spTree>
+    <p:extLst>
+      <p:ext uri="{BB962C8B-B14F-4D97-AF65-F5344CB8AC3E}">
+        <p14:creationId xmlns:p14="http://schemas.microsoft.com/office/powerpoint/2010/main" val="2404552178"/>
+      </p:ext>
+    </p:extLst>
+  </p:cSld>
+  <p:clrMapOvr>
+    <a:masterClrMapping/>
+  </p:clrMapOvr>
+  <mc:AlternateContent xmlns:mc="http://schemas.openxmlformats.org/markup-compatibility/2006" xmlns:p14="http://schemas.microsoft.com/office/powerpoint/2010/main">
+    <mc:Choice Requires="p14">
+      <p:transition spd="slow" p14:dur="2000" advTm="4126"/>
+    </mc:Choice>
+    <mc:Fallback xmlns="">
+      <p:transition spd="slow" advTm="4126"/>
+    </mc:Fallback>
+  </mc:AlternateContent>
+</p:sld>
+</file>
+
+<file path=ppt/slides/slide7.xml><?xml version="1.0" encoding="utf-8"?>
+<p:sld xmlns:a="http://schemas.openxmlformats.org/drawingml/2006/main" xmlns:r="http://schemas.openxmlformats.org/officeDocument/2006/relationships" xmlns:p="http://schemas.openxmlformats.org/presentationml/2006/main">
+  <p:cSld>
+    <p:spTree>
+      <p:nvGrpSpPr>
+        <p:cNvPr id="1" name=""/>
+        <p:cNvGrpSpPr/>
+        <p:nvPr/>
+      </p:nvGrpSpPr>
+      <p:grpSpPr>
+        <a:xfrm>
+          <a:off x="0" y="0"/>
+          <a:ext cx="0" cy="0"/>
+          <a:chOff x="0" y="0"/>
+          <a:chExt cx="0" cy="0"/>
+        </a:xfrm>
+      </p:grpSpPr>
+      <p:pic>
+        <p:nvPicPr>
+          <p:cNvPr id="2" name="Picture 1">
+            <a:extLst>
+              <a:ext uri="{FF2B5EF4-FFF2-40B4-BE49-F238E27FC236}">
+                <a16:creationId xmlns:a16="http://schemas.microsoft.com/office/drawing/2014/main" id="{6E48F301-D28F-475A-AAB9-F474077E5A4C}"/>
+              </a:ext>
+            </a:extLst>
+          </p:cNvPr>
+          <p:cNvPicPr>
+            <a:picLocks noChangeAspect="1"/>
+          </p:cNvPicPr>
+          <p:nvPr/>
+        </p:nvPicPr>
+        <p:blipFill>
+          <a:blip r:embed="rId2"/>
+          <a:stretch>
+            <a:fillRect/>
+          </a:stretch>
+        </p:blipFill>
+        <p:spPr>
+          <a:xfrm>
+            <a:off x="0" y="-194554"/>
+            <a:ext cx="12192000" cy="7052553"/>
+          </a:xfrm>
+          <a:prstGeom prst="rect">
+            <a:avLst/>
+          </a:prstGeom>
+        </p:spPr>
+      </p:pic>
+    </p:spTree>
+    <p:extLst>
+      <p:ext uri="{BB962C8B-B14F-4D97-AF65-F5344CB8AC3E}">
+        <p14:creationId xmlns:p14="http://schemas.microsoft.com/office/powerpoint/2010/main" val="4158168536"/>
+      </p:ext>
+    </p:extLst>
+  </p:cSld>
+  <p:clrMapOvr>
+    <a:masterClrMapping/>
+  </p:clrMapOvr>
+  <mc:AlternateContent xmlns:mc="http://schemas.openxmlformats.org/markup-compatibility/2006" xmlns:p14="http://schemas.microsoft.com/office/powerpoint/2010/main">
+    <mc:Choice Requires="p14">
+      <p:transition spd="slow" p14:dur="2000" advTm="4126"/>
+    </mc:Choice>
+    <mc:Fallback xmlns="">
+      <p:transition spd="slow" advTm="4126"/>
+    </mc:Fallback>
+  </mc:AlternateContent>
 </p:sld>
 </file>
 

</xml_diff>

<commit_message>
meghana week 4 homework ppt and json file
</commit_message>
<xml_diff>
--- a/Week04-Tours/Homework/meghana_week4_homework/meghana_week4_homework.pptx
+++ b/Week04-Tours/Homework/meghana_week4_homework/meghana_week4_homework.pptx
@@ -2,7 +2,7 @@
 <file path=ppt/presentation.xml><?xml version="1.0" encoding="utf-8"?>
 <p:presentation xmlns:a="http://schemas.openxmlformats.org/drawingml/2006/main" xmlns:r="http://schemas.openxmlformats.org/officeDocument/2006/relationships" xmlns:p="http://schemas.openxmlformats.org/presentationml/2006/main" saveSubsetFonts="1">
   <p:sldMasterIdLst>
-    <p:sldMasterId id="2147483648" r:id="rId1"/>
+    <p:sldMasterId id="2147483768" r:id="rId1"/>
   </p:sldMasterIdLst>
   <p:sldIdLst>
     <p:sldId id="256" r:id="rId2"/>
@@ -11,7 +11,6 @@
     <p:sldId id="259" r:id="rId5"/>
     <p:sldId id="260" r:id="rId6"/>
     <p:sldId id="261" r:id="rId7"/>
-    <p:sldId id="262" r:id="rId8"/>
   </p:sldIdLst>
   <p:sldSz cx="12192000" cy="6858000"/>
   <p:notesSz cx="6858000" cy="9144000"/>
@@ -137,7 +136,13 @@
       </p:grpSpPr>
       <p:sp>
         <p:nvSpPr>
-          <p:cNvPr id="2" name="Title 1"/>
+          <p:cNvPr id="2" name="Title 1">
+            <a:extLst>
+              <a:ext uri="{FF2B5EF4-FFF2-40B4-BE49-F238E27FC236}">
+                <a16:creationId xmlns:a16="http://schemas.microsoft.com/office/drawing/2014/main" id="{427F39D5-B330-4BE7-ABC9-0DB80937D923}"/>
+              </a:ext>
+            </a:extLst>
+          </p:cNvPr>
           <p:cNvSpPr>
             <a:spLocks noGrp="1"/>
           </p:cNvSpPr>
@@ -168,7 +173,13 @@
       </p:sp>
       <p:sp>
         <p:nvSpPr>
-          <p:cNvPr id="3" name="Subtitle 2"/>
+          <p:cNvPr id="3" name="Subtitle 2">
+            <a:extLst>
+              <a:ext uri="{FF2B5EF4-FFF2-40B4-BE49-F238E27FC236}">
+                <a16:creationId xmlns:a16="http://schemas.microsoft.com/office/drawing/2014/main" id="{A6071612-3371-4E9F-AFB5-5B1000517468}"/>
+              </a:ext>
+            </a:extLst>
+          </p:cNvPr>
           <p:cNvSpPr>
             <a:spLocks noGrp="1"/>
           </p:cNvSpPr>
@@ -232,7 +243,13 @@
       </p:sp>
       <p:sp>
         <p:nvSpPr>
-          <p:cNvPr id="4" name="Date Placeholder 3"/>
+          <p:cNvPr id="4" name="Date Placeholder 3">
+            <a:extLst>
+              <a:ext uri="{FF2B5EF4-FFF2-40B4-BE49-F238E27FC236}">
+                <a16:creationId xmlns:a16="http://schemas.microsoft.com/office/drawing/2014/main" id="{9F7BD34D-8229-4789-92FE-7412B0146C77}"/>
+              </a:ext>
+            </a:extLst>
+          </p:cNvPr>
           <p:cNvSpPr>
             <a:spLocks noGrp="1"/>
           </p:cNvSpPr>
@@ -255,7 +272,13 @@
       </p:sp>
       <p:sp>
         <p:nvSpPr>
-          <p:cNvPr id="5" name="Footer Placeholder 4"/>
+          <p:cNvPr id="5" name="Footer Placeholder 4">
+            <a:extLst>
+              <a:ext uri="{FF2B5EF4-FFF2-40B4-BE49-F238E27FC236}">
+                <a16:creationId xmlns:a16="http://schemas.microsoft.com/office/drawing/2014/main" id="{0FAE21F0-7708-4023-A848-E1F8374F5BE3}"/>
+              </a:ext>
+            </a:extLst>
+          </p:cNvPr>
           <p:cNvSpPr>
             <a:spLocks noGrp="1"/>
           </p:cNvSpPr>
@@ -274,7 +297,13 @@
       </p:sp>
       <p:sp>
         <p:nvSpPr>
-          <p:cNvPr id="6" name="Slide Number Placeholder 5"/>
+          <p:cNvPr id="6" name="Slide Number Placeholder 5">
+            <a:extLst>
+              <a:ext uri="{FF2B5EF4-FFF2-40B4-BE49-F238E27FC236}">
+                <a16:creationId xmlns:a16="http://schemas.microsoft.com/office/drawing/2014/main" id="{41C0957C-73B7-4FCB-965A-DAEA03AF1084}"/>
+              </a:ext>
+            </a:extLst>
+          </p:cNvPr>
           <p:cNvSpPr>
             <a:spLocks noGrp="1"/>
           </p:cNvSpPr>
@@ -298,7 +327,7 @@
     </p:spTree>
     <p:extLst>
       <p:ext uri="{BB962C8B-B14F-4D97-AF65-F5344CB8AC3E}">
-        <p14:creationId xmlns:p14="http://schemas.microsoft.com/office/powerpoint/2010/main" val="353295149"/>
+        <p14:creationId xmlns:p14="http://schemas.microsoft.com/office/powerpoint/2010/main" val="581856677"/>
       </p:ext>
     </p:extLst>
   </p:cSld>
@@ -327,7 +356,13 @@
       </p:grpSpPr>
       <p:sp>
         <p:nvSpPr>
-          <p:cNvPr id="2" name="Title 1"/>
+          <p:cNvPr id="2" name="Title 1">
+            <a:extLst>
+              <a:ext uri="{FF2B5EF4-FFF2-40B4-BE49-F238E27FC236}">
+                <a16:creationId xmlns:a16="http://schemas.microsoft.com/office/drawing/2014/main" id="{5F69F0E2-DF7F-40B0-B8B6-5180CA70961F}"/>
+              </a:ext>
+            </a:extLst>
+          </p:cNvPr>
           <p:cNvSpPr>
             <a:spLocks noGrp="1"/>
           </p:cNvSpPr>
@@ -349,7 +384,13 @@
       </p:sp>
       <p:sp>
         <p:nvSpPr>
-          <p:cNvPr id="3" name="Vertical Text Placeholder 2"/>
+          <p:cNvPr id="3" name="Vertical Text Placeholder 2">
+            <a:extLst>
+              <a:ext uri="{FF2B5EF4-FFF2-40B4-BE49-F238E27FC236}">
+                <a16:creationId xmlns:a16="http://schemas.microsoft.com/office/drawing/2014/main" id="{282F0E03-A250-4932-99E8-B1444FBCD004}"/>
+              </a:ext>
+            </a:extLst>
+          </p:cNvPr>
           <p:cNvSpPr>
             <a:spLocks noGrp="1"/>
           </p:cNvSpPr>
@@ -400,7 +441,13 @@
       </p:sp>
       <p:sp>
         <p:nvSpPr>
-          <p:cNvPr id="4" name="Date Placeholder 3"/>
+          <p:cNvPr id="4" name="Date Placeholder 3">
+            <a:extLst>
+              <a:ext uri="{FF2B5EF4-FFF2-40B4-BE49-F238E27FC236}">
+                <a16:creationId xmlns:a16="http://schemas.microsoft.com/office/drawing/2014/main" id="{80F56046-7EDC-4098-8E6E-0BFB364963B9}"/>
+              </a:ext>
+            </a:extLst>
+          </p:cNvPr>
           <p:cNvSpPr>
             <a:spLocks noGrp="1"/>
           </p:cNvSpPr>
@@ -423,7 +470,13 @@
       </p:sp>
       <p:sp>
         <p:nvSpPr>
-          <p:cNvPr id="5" name="Footer Placeholder 4"/>
+          <p:cNvPr id="5" name="Footer Placeholder 4">
+            <a:extLst>
+              <a:ext uri="{FF2B5EF4-FFF2-40B4-BE49-F238E27FC236}">
+                <a16:creationId xmlns:a16="http://schemas.microsoft.com/office/drawing/2014/main" id="{B18A9BAC-419F-4100-8723-8300FC85D578}"/>
+              </a:ext>
+            </a:extLst>
+          </p:cNvPr>
           <p:cNvSpPr>
             <a:spLocks noGrp="1"/>
           </p:cNvSpPr>
@@ -442,7 +495,13 @@
       </p:sp>
       <p:sp>
         <p:nvSpPr>
-          <p:cNvPr id="6" name="Slide Number Placeholder 5"/>
+          <p:cNvPr id="6" name="Slide Number Placeholder 5">
+            <a:extLst>
+              <a:ext uri="{FF2B5EF4-FFF2-40B4-BE49-F238E27FC236}">
+                <a16:creationId xmlns:a16="http://schemas.microsoft.com/office/drawing/2014/main" id="{438871D4-B085-44A9-A52A-0822666C7CF7}"/>
+              </a:ext>
+            </a:extLst>
+          </p:cNvPr>
           <p:cNvSpPr>
             <a:spLocks noGrp="1"/>
           </p:cNvSpPr>
@@ -466,7 +525,7 @@
     </p:spTree>
     <p:extLst>
       <p:ext uri="{BB962C8B-B14F-4D97-AF65-F5344CB8AC3E}">
-        <p14:creationId xmlns:p14="http://schemas.microsoft.com/office/powerpoint/2010/main" val="607131919"/>
+        <p14:creationId xmlns:p14="http://schemas.microsoft.com/office/powerpoint/2010/main" val="2819892882"/>
       </p:ext>
     </p:extLst>
   </p:cSld>
@@ -495,7 +554,13 @@
       </p:grpSpPr>
       <p:sp>
         <p:nvSpPr>
-          <p:cNvPr id="2" name="Vertical Title 1"/>
+          <p:cNvPr id="2" name="Vertical Title 1">
+            <a:extLst>
+              <a:ext uri="{FF2B5EF4-FFF2-40B4-BE49-F238E27FC236}">
+                <a16:creationId xmlns:a16="http://schemas.microsoft.com/office/drawing/2014/main" id="{03531DAD-C3EF-4A06-A3AA-2C57424A5DE0}"/>
+              </a:ext>
+            </a:extLst>
+          </p:cNvPr>
           <p:cNvSpPr>
             <a:spLocks noGrp="1"/>
           </p:cNvSpPr>
@@ -522,7 +587,13 @@
       </p:sp>
       <p:sp>
         <p:nvSpPr>
-          <p:cNvPr id="3" name="Vertical Text Placeholder 2"/>
+          <p:cNvPr id="3" name="Vertical Text Placeholder 2">
+            <a:extLst>
+              <a:ext uri="{FF2B5EF4-FFF2-40B4-BE49-F238E27FC236}">
+                <a16:creationId xmlns:a16="http://schemas.microsoft.com/office/drawing/2014/main" id="{3A803BB9-45A5-4D0B-B044-9BC94544DBC9}"/>
+              </a:ext>
+            </a:extLst>
+          </p:cNvPr>
           <p:cNvSpPr>
             <a:spLocks noGrp="1"/>
           </p:cNvSpPr>
@@ -578,7 +649,13 @@
       </p:sp>
       <p:sp>
         <p:nvSpPr>
-          <p:cNvPr id="4" name="Date Placeholder 3"/>
+          <p:cNvPr id="4" name="Date Placeholder 3">
+            <a:extLst>
+              <a:ext uri="{FF2B5EF4-FFF2-40B4-BE49-F238E27FC236}">
+                <a16:creationId xmlns:a16="http://schemas.microsoft.com/office/drawing/2014/main" id="{90DDD322-6F00-4403-BD6F-6D5AF6D5FA64}"/>
+              </a:ext>
+            </a:extLst>
+          </p:cNvPr>
           <p:cNvSpPr>
             <a:spLocks noGrp="1"/>
           </p:cNvSpPr>
@@ -601,7 +678,13 @@
       </p:sp>
       <p:sp>
         <p:nvSpPr>
-          <p:cNvPr id="5" name="Footer Placeholder 4"/>
+          <p:cNvPr id="5" name="Footer Placeholder 4">
+            <a:extLst>
+              <a:ext uri="{FF2B5EF4-FFF2-40B4-BE49-F238E27FC236}">
+                <a16:creationId xmlns:a16="http://schemas.microsoft.com/office/drawing/2014/main" id="{0B2A7F94-112B-4F17-B3C4-D258A46D738D}"/>
+              </a:ext>
+            </a:extLst>
+          </p:cNvPr>
           <p:cNvSpPr>
             <a:spLocks noGrp="1"/>
           </p:cNvSpPr>
@@ -620,7 +703,13 @@
       </p:sp>
       <p:sp>
         <p:nvSpPr>
-          <p:cNvPr id="6" name="Slide Number Placeholder 5"/>
+          <p:cNvPr id="6" name="Slide Number Placeholder 5">
+            <a:extLst>
+              <a:ext uri="{FF2B5EF4-FFF2-40B4-BE49-F238E27FC236}">
+                <a16:creationId xmlns:a16="http://schemas.microsoft.com/office/drawing/2014/main" id="{3D6AC69C-82A5-4505-B471-A4E478BB76FE}"/>
+              </a:ext>
+            </a:extLst>
+          </p:cNvPr>
           <p:cNvSpPr>
             <a:spLocks noGrp="1"/>
           </p:cNvSpPr>
@@ -644,7 +733,7 @@
     </p:spTree>
     <p:extLst>
       <p:ext uri="{BB962C8B-B14F-4D97-AF65-F5344CB8AC3E}">
-        <p14:creationId xmlns:p14="http://schemas.microsoft.com/office/powerpoint/2010/main" val="108076155"/>
+        <p14:creationId xmlns:p14="http://schemas.microsoft.com/office/powerpoint/2010/main" val="2344443621"/>
       </p:ext>
     </p:extLst>
   </p:cSld>
@@ -673,7 +762,13 @@
       </p:grpSpPr>
       <p:sp>
         <p:nvSpPr>
-          <p:cNvPr id="2" name="Title 1"/>
+          <p:cNvPr id="2" name="Title 1">
+            <a:extLst>
+              <a:ext uri="{FF2B5EF4-FFF2-40B4-BE49-F238E27FC236}">
+                <a16:creationId xmlns:a16="http://schemas.microsoft.com/office/drawing/2014/main" id="{E056A94E-93B7-4ED3-A328-AFFECEB25A13}"/>
+              </a:ext>
+            </a:extLst>
+          </p:cNvPr>
           <p:cNvSpPr>
             <a:spLocks noGrp="1"/>
           </p:cNvSpPr>
@@ -695,7 +790,13 @@
       </p:sp>
       <p:sp>
         <p:nvSpPr>
-          <p:cNvPr id="3" name="Content Placeholder 2"/>
+          <p:cNvPr id="3" name="Content Placeholder 2">
+            <a:extLst>
+              <a:ext uri="{FF2B5EF4-FFF2-40B4-BE49-F238E27FC236}">
+                <a16:creationId xmlns:a16="http://schemas.microsoft.com/office/drawing/2014/main" id="{194A2069-627E-43AE-9983-DD7511693E6E}"/>
+              </a:ext>
+            </a:extLst>
+          </p:cNvPr>
           <p:cNvSpPr>
             <a:spLocks noGrp="1"/>
           </p:cNvSpPr>
@@ -746,7 +847,13 @@
       </p:sp>
       <p:sp>
         <p:nvSpPr>
-          <p:cNvPr id="4" name="Date Placeholder 3"/>
+          <p:cNvPr id="4" name="Date Placeholder 3">
+            <a:extLst>
+              <a:ext uri="{FF2B5EF4-FFF2-40B4-BE49-F238E27FC236}">
+                <a16:creationId xmlns:a16="http://schemas.microsoft.com/office/drawing/2014/main" id="{B103A6DC-FA59-448F-90B3-5DA77D674306}"/>
+              </a:ext>
+            </a:extLst>
+          </p:cNvPr>
           <p:cNvSpPr>
             <a:spLocks noGrp="1"/>
           </p:cNvSpPr>
@@ -769,7 +876,13 @@
       </p:sp>
       <p:sp>
         <p:nvSpPr>
-          <p:cNvPr id="5" name="Footer Placeholder 4"/>
+          <p:cNvPr id="5" name="Footer Placeholder 4">
+            <a:extLst>
+              <a:ext uri="{FF2B5EF4-FFF2-40B4-BE49-F238E27FC236}">
+                <a16:creationId xmlns:a16="http://schemas.microsoft.com/office/drawing/2014/main" id="{4FB2FF02-1858-4B76-85EB-0A868CDF795F}"/>
+              </a:ext>
+            </a:extLst>
+          </p:cNvPr>
           <p:cNvSpPr>
             <a:spLocks noGrp="1"/>
           </p:cNvSpPr>
@@ -788,7 +901,13 @@
       </p:sp>
       <p:sp>
         <p:nvSpPr>
-          <p:cNvPr id="6" name="Slide Number Placeholder 5"/>
+          <p:cNvPr id="6" name="Slide Number Placeholder 5">
+            <a:extLst>
+              <a:ext uri="{FF2B5EF4-FFF2-40B4-BE49-F238E27FC236}">
+                <a16:creationId xmlns:a16="http://schemas.microsoft.com/office/drawing/2014/main" id="{CCAF77BA-A7D9-41D0-866F-9405EC63241D}"/>
+              </a:ext>
+            </a:extLst>
+          </p:cNvPr>
           <p:cNvSpPr>
             <a:spLocks noGrp="1"/>
           </p:cNvSpPr>
@@ -812,7 +931,7 @@
     </p:spTree>
     <p:extLst>
       <p:ext uri="{BB962C8B-B14F-4D97-AF65-F5344CB8AC3E}">
-        <p14:creationId xmlns:p14="http://schemas.microsoft.com/office/powerpoint/2010/main" val="2230275814"/>
+        <p14:creationId xmlns:p14="http://schemas.microsoft.com/office/powerpoint/2010/main" val="4043232159"/>
       </p:ext>
     </p:extLst>
   </p:cSld>
@@ -841,7 +960,13 @@
       </p:grpSpPr>
       <p:sp>
         <p:nvSpPr>
-          <p:cNvPr id="2" name="Title 1"/>
+          <p:cNvPr id="2" name="Title 1">
+            <a:extLst>
+              <a:ext uri="{FF2B5EF4-FFF2-40B4-BE49-F238E27FC236}">
+                <a16:creationId xmlns:a16="http://schemas.microsoft.com/office/drawing/2014/main" id="{9C6538E9-31FB-42AF-9669-A3419CD558B4}"/>
+              </a:ext>
+            </a:extLst>
+          </p:cNvPr>
           <p:cNvSpPr>
             <a:spLocks noGrp="1"/>
           </p:cNvSpPr>
@@ -872,7 +997,13 @@
       </p:sp>
       <p:sp>
         <p:nvSpPr>
-          <p:cNvPr id="3" name="Text Placeholder 2"/>
+          <p:cNvPr id="3" name="Text Placeholder 2">
+            <a:extLst>
+              <a:ext uri="{FF2B5EF4-FFF2-40B4-BE49-F238E27FC236}">
+                <a16:creationId xmlns:a16="http://schemas.microsoft.com/office/drawing/2014/main" id="{6ED33EF8-55FE-40A7-860F-E2F67D62E778}"/>
+              </a:ext>
+            </a:extLst>
+          </p:cNvPr>
           <p:cNvSpPr>
             <a:spLocks noGrp="1"/>
           </p:cNvSpPr>
@@ -991,7 +1122,13 @@
       </p:sp>
       <p:sp>
         <p:nvSpPr>
-          <p:cNvPr id="4" name="Date Placeholder 3"/>
+          <p:cNvPr id="4" name="Date Placeholder 3">
+            <a:extLst>
+              <a:ext uri="{FF2B5EF4-FFF2-40B4-BE49-F238E27FC236}">
+                <a16:creationId xmlns:a16="http://schemas.microsoft.com/office/drawing/2014/main" id="{AB7D4912-EF61-4846-992D-6A2A18683206}"/>
+              </a:ext>
+            </a:extLst>
+          </p:cNvPr>
           <p:cNvSpPr>
             <a:spLocks noGrp="1"/>
           </p:cNvSpPr>
@@ -1014,7 +1151,13 @@
       </p:sp>
       <p:sp>
         <p:nvSpPr>
-          <p:cNvPr id="5" name="Footer Placeholder 4"/>
+          <p:cNvPr id="5" name="Footer Placeholder 4">
+            <a:extLst>
+              <a:ext uri="{FF2B5EF4-FFF2-40B4-BE49-F238E27FC236}">
+                <a16:creationId xmlns:a16="http://schemas.microsoft.com/office/drawing/2014/main" id="{056DB718-6C38-481D-A737-5E5B952A0C8D}"/>
+              </a:ext>
+            </a:extLst>
+          </p:cNvPr>
           <p:cNvSpPr>
             <a:spLocks noGrp="1"/>
           </p:cNvSpPr>
@@ -1033,7 +1176,13 @@
       </p:sp>
       <p:sp>
         <p:nvSpPr>
-          <p:cNvPr id="6" name="Slide Number Placeholder 5"/>
+          <p:cNvPr id="6" name="Slide Number Placeholder 5">
+            <a:extLst>
+              <a:ext uri="{FF2B5EF4-FFF2-40B4-BE49-F238E27FC236}">
+                <a16:creationId xmlns:a16="http://schemas.microsoft.com/office/drawing/2014/main" id="{5A15F669-1442-4432-9D98-31E3A955757A}"/>
+              </a:ext>
+            </a:extLst>
+          </p:cNvPr>
           <p:cNvSpPr>
             <a:spLocks noGrp="1"/>
           </p:cNvSpPr>
@@ -1057,7 +1206,7 @@
     </p:spTree>
     <p:extLst>
       <p:ext uri="{BB962C8B-B14F-4D97-AF65-F5344CB8AC3E}">
-        <p14:creationId xmlns:p14="http://schemas.microsoft.com/office/powerpoint/2010/main" val="2354295980"/>
+        <p14:creationId xmlns:p14="http://schemas.microsoft.com/office/powerpoint/2010/main" val="3257315795"/>
       </p:ext>
     </p:extLst>
   </p:cSld>
@@ -1086,7 +1235,13 @@
       </p:grpSpPr>
       <p:sp>
         <p:nvSpPr>
-          <p:cNvPr id="2" name="Title 1"/>
+          <p:cNvPr id="2" name="Title 1">
+            <a:extLst>
+              <a:ext uri="{FF2B5EF4-FFF2-40B4-BE49-F238E27FC236}">
+                <a16:creationId xmlns:a16="http://schemas.microsoft.com/office/drawing/2014/main" id="{FAE8BD16-A1EE-42A2-8D09-B3EF7B95EC91}"/>
+              </a:ext>
+            </a:extLst>
+          </p:cNvPr>
           <p:cNvSpPr>
             <a:spLocks noGrp="1"/>
           </p:cNvSpPr>
@@ -1108,7 +1263,13 @@
       </p:sp>
       <p:sp>
         <p:nvSpPr>
-          <p:cNvPr id="3" name="Content Placeholder 2"/>
+          <p:cNvPr id="3" name="Content Placeholder 2">
+            <a:extLst>
+              <a:ext uri="{FF2B5EF4-FFF2-40B4-BE49-F238E27FC236}">
+                <a16:creationId xmlns:a16="http://schemas.microsoft.com/office/drawing/2014/main" id="{06FCE4B9-2BA8-4500-99A3-C583A51626FA}"/>
+              </a:ext>
+            </a:extLst>
+          </p:cNvPr>
           <p:cNvSpPr>
             <a:spLocks noGrp="1"/>
           </p:cNvSpPr>
@@ -1164,7 +1325,13 @@
       </p:sp>
       <p:sp>
         <p:nvSpPr>
-          <p:cNvPr id="4" name="Content Placeholder 3"/>
+          <p:cNvPr id="4" name="Content Placeholder 3">
+            <a:extLst>
+              <a:ext uri="{FF2B5EF4-FFF2-40B4-BE49-F238E27FC236}">
+                <a16:creationId xmlns:a16="http://schemas.microsoft.com/office/drawing/2014/main" id="{01D9FB56-AF7C-4F97-A465-8E8BDA788BC7}"/>
+              </a:ext>
+            </a:extLst>
+          </p:cNvPr>
           <p:cNvSpPr>
             <a:spLocks noGrp="1"/>
           </p:cNvSpPr>
@@ -1220,7 +1387,13 @@
       </p:sp>
       <p:sp>
         <p:nvSpPr>
-          <p:cNvPr id="5" name="Date Placeholder 4"/>
+          <p:cNvPr id="5" name="Date Placeholder 4">
+            <a:extLst>
+              <a:ext uri="{FF2B5EF4-FFF2-40B4-BE49-F238E27FC236}">
+                <a16:creationId xmlns:a16="http://schemas.microsoft.com/office/drawing/2014/main" id="{70C275DA-4ABC-4E75-B70B-0306F9849BAE}"/>
+              </a:ext>
+            </a:extLst>
+          </p:cNvPr>
           <p:cNvSpPr>
             <a:spLocks noGrp="1"/>
           </p:cNvSpPr>
@@ -1243,7 +1416,13 @@
       </p:sp>
       <p:sp>
         <p:nvSpPr>
-          <p:cNvPr id="6" name="Footer Placeholder 5"/>
+          <p:cNvPr id="6" name="Footer Placeholder 5">
+            <a:extLst>
+              <a:ext uri="{FF2B5EF4-FFF2-40B4-BE49-F238E27FC236}">
+                <a16:creationId xmlns:a16="http://schemas.microsoft.com/office/drawing/2014/main" id="{5A81FA0B-AC1C-4366-A87E-B6C8AD356B7C}"/>
+              </a:ext>
+            </a:extLst>
+          </p:cNvPr>
           <p:cNvSpPr>
             <a:spLocks noGrp="1"/>
           </p:cNvSpPr>
@@ -1262,7 +1441,13 @@
       </p:sp>
       <p:sp>
         <p:nvSpPr>
-          <p:cNvPr id="7" name="Slide Number Placeholder 6"/>
+          <p:cNvPr id="7" name="Slide Number Placeholder 6">
+            <a:extLst>
+              <a:ext uri="{FF2B5EF4-FFF2-40B4-BE49-F238E27FC236}">
+                <a16:creationId xmlns:a16="http://schemas.microsoft.com/office/drawing/2014/main" id="{C3DB1FFE-FC29-4552-B95D-2C7541C347B1}"/>
+              </a:ext>
+            </a:extLst>
+          </p:cNvPr>
           <p:cNvSpPr>
             <a:spLocks noGrp="1"/>
           </p:cNvSpPr>
@@ -1286,7 +1471,7 @@
     </p:spTree>
     <p:extLst>
       <p:ext uri="{BB962C8B-B14F-4D97-AF65-F5344CB8AC3E}">
-        <p14:creationId xmlns:p14="http://schemas.microsoft.com/office/powerpoint/2010/main" val="3179947294"/>
+        <p14:creationId xmlns:p14="http://schemas.microsoft.com/office/powerpoint/2010/main" val="1484051306"/>
       </p:ext>
     </p:extLst>
   </p:cSld>
@@ -1315,7 +1500,13 @@
       </p:grpSpPr>
       <p:sp>
         <p:nvSpPr>
-          <p:cNvPr id="2" name="Title 1"/>
+          <p:cNvPr id="2" name="Title 1">
+            <a:extLst>
+              <a:ext uri="{FF2B5EF4-FFF2-40B4-BE49-F238E27FC236}">
+                <a16:creationId xmlns:a16="http://schemas.microsoft.com/office/drawing/2014/main" id="{F821D25E-62E7-4484-B905-576CBDAD5803}"/>
+              </a:ext>
+            </a:extLst>
+          </p:cNvPr>
           <p:cNvSpPr>
             <a:spLocks noGrp="1"/>
           </p:cNvSpPr>
@@ -1342,7 +1533,13 @@
       </p:sp>
       <p:sp>
         <p:nvSpPr>
-          <p:cNvPr id="3" name="Text Placeholder 2"/>
+          <p:cNvPr id="3" name="Text Placeholder 2">
+            <a:extLst>
+              <a:ext uri="{FF2B5EF4-FFF2-40B4-BE49-F238E27FC236}">
+                <a16:creationId xmlns:a16="http://schemas.microsoft.com/office/drawing/2014/main" id="{3C75F061-FD97-43CF-834D-3E824D1C5E41}"/>
+              </a:ext>
+            </a:extLst>
+          </p:cNvPr>
           <p:cNvSpPr>
             <a:spLocks noGrp="1"/>
           </p:cNvSpPr>
@@ -1407,7 +1604,13 @@
       </p:sp>
       <p:sp>
         <p:nvSpPr>
-          <p:cNvPr id="4" name="Content Placeholder 3"/>
+          <p:cNvPr id="4" name="Content Placeholder 3">
+            <a:extLst>
+              <a:ext uri="{FF2B5EF4-FFF2-40B4-BE49-F238E27FC236}">
+                <a16:creationId xmlns:a16="http://schemas.microsoft.com/office/drawing/2014/main" id="{456A1BE9-02A5-4C21-A980-8BEF69E7E40D}"/>
+              </a:ext>
+            </a:extLst>
+          </p:cNvPr>
           <p:cNvSpPr>
             <a:spLocks noGrp="1"/>
           </p:cNvSpPr>
@@ -1463,7 +1666,13 @@
       </p:sp>
       <p:sp>
         <p:nvSpPr>
-          <p:cNvPr id="5" name="Text Placeholder 4"/>
+          <p:cNvPr id="5" name="Text Placeholder 4">
+            <a:extLst>
+              <a:ext uri="{FF2B5EF4-FFF2-40B4-BE49-F238E27FC236}">
+                <a16:creationId xmlns:a16="http://schemas.microsoft.com/office/drawing/2014/main" id="{D1628C87-8755-4F67-9A11-9A9B6CFD7135}"/>
+              </a:ext>
+            </a:extLst>
+          </p:cNvPr>
           <p:cNvSpPr>
             <a:spLocks noGrp="1"/>
           </p:cNvSpPr>
@@ -1528,7 +1737,13 @@
       </p:sp>
       <p:sp>
         <p:nvSpPr>
-          <p:cNvPr id="6" name="Content Placeholder 5"/>
+          <p:cNvPr id="6" name="Content Placeholder 5">
+            <a:extLst>
+              <a:ext uri="{FF2B5EF4-FFF2-40B4-BE49-F238E27FC236}">
+                <a16:creationId xmlns:a16="http://schemas.microsoft.com/office/drawing/2014/main" id="{205C9613-64E0-475B-8FE4-D9A3B8857FC9}"/>
+              </a:ext>
+            </a:extLst>
+          </p:cNvPr>
           <p:cNvSpPr>
             <a:spLocks noGrp="1"/>
           </p:cNvSpPr>
@@ -1584,7 +1799,13 @@
       </p:sp>
       <p:sp>
         <p:nvSpPr>
-          <p:cNvPr id="7" name="Date Placeholder 6"/>
+          <p:cNvPr id="7" name="Date Placeholder 6">
+            <a:extLst>
+              <a:ext uri="{FF2B5EF4-FFF2-40B4-BE49-F238E27FC236}">
+                <a16:creationId xmlns:a16="http://schemas.microsoft.com/office/drawing/2014/main" id="{913EF8EE-128E-4850-BF11-1E32FF1A7348}"/>
+              </a:ext>
+            </a:extLst>
+          </p:cNvPr>
           <p:cNvSpPr>
             <a:spLocks noGrp="1"/>
           </p:cNvSpPr>
@@ -1607,7 +1828,13 @@
       </p:sp>
       <p:sp>
         <p:nvSpPr>
-          <p:cNvPr id="8" name="Footer Placeholder 7"/>
+          <p:cNvPr id="8" name="Footer Placeholder 7">
+            <a:extLst>
+              <a:ext uri="{FF2B5EF4-FFF2-40B4-BE49-F238E27FC236}">
+                <a16:creationId xmlns:a16="http://schemas.microsoft.com/office/drawing/2014/main" id="{1427A976-F2AD-4817-9B71-1EF92B806983}"/>
+              </a:ext>
+            </a:extLst>
+          </p:cNvPr>
           <p:cNvSpPr>
             <a:spLocks noGrp="1"/>
           </p:cNvSpPr>
@@ -1626,7 +1853,13 @@
       </p:sp>
       <p:sp>
         <p:nvSpPr>
-          <p:cNvPr id="9" name="Slide Number Placeholder 8"/>
+          <p:cNvPr id="9" name="Slide Number Placeholder 8">
+            <a:extLst>
+              <a:ext uri="{FF2B5EF4-FFF2-40B4-BE49-F238E27FC236}">
+                <a16:creationId xmlns:a16="http://schemas.microsoft.com/office/drawing/2014/main" id="{1082A967-A654-47E9-A7B9-FFAF309434A4}"/>
+              </a:ext>
+            </a:extLst>
+          </p:cNvPr>
           <p:cNvSpPr>
             <a:spLocks noGrp="1"/>
           </p:cNvSpPr>
@@ -1650,7 +1883,7 @@
     </p:spTree>
     <p:extLst>
       <p:ext uri="{BB962C8B-B14F-4D97-AF65-F5344CB8AC3E}">
-        <p14:creationId xmlns:p14="http://schemas.microsoft.com/office/powerpoint/2010/main" val="3983919973"/>
+        <p14:creationId xmlns:p14="http://schemas.microsoft.com/office/powerpoint/2010/main" val="4150975992"/>
       </p:ext>
     </p:extLst>
   </p:cSld>
@@ -1679,7 +1912,13 @@
       </p:grpSpPr>
       <p:sp>
         <p:nvSpPr>
-          <p:cNvPr id="2" name="Title 1"/>
+          <p:cNvPr id="2" name="Title 1">
+            <a:extLst>
+              <a:ext uri="{FF2B5EF4-FFF2-40B4-BE49-F238E27FC236}">
+                <a16:creationId xmlns:a16="http://schemas.microsoft.com/office/drawing/2014/main" id="{AF54A8AB-E865-4E3A-B242-176A2574281D}"/>
+              </a:ext>
+            </a:extLst>
+          </p:cNvPr>
           <p:cNvSpPr>
             <a:spLocks noGrp="1"/>
           </p:cNvSpPr>
@@ -1701,7 +1940,13 @@
       </p:sp>
       <p:sp>
         <p:nvSpPr>
-          <p:cNvPr id="3" name="Date Placeholder 2"/>
+          <p:cNvPr id="3" name="Date Placeholder 2">
+            <a:extLst>
+              <a:ext uri="{FF2B5EF4-FFF2-40B4-BE49-F238E27FC236}">
+                <a16:creationId xmlns:a16="http://schemas.microsoft.com/office/drawing/2014/main" id="{4ED19C68-2FD9-48EE-9C55-3AEB741B7117}"/>
+              </a:ext>
+            </a:extLst>
+          </p:cNvPr>
           <p:cNvSpPr>
             <a:spLocks noGrp="1"/>
           </p:cNvSpPr>
@@ -1724,7 +1969,13 @@
       </p:sp>
       <p:sp>
         <p:nvSpPr>
-          <p:cNvPr id="4" name="Footer Placeholder 3"/>
+          <p:cNvPr id="4" name="Footer Placeholder 3">
+            <a:extLst>
+              <a:ext uri="{FF2B5EF4-FFF2-40B4-BE49-F238E27FC236}">
+                <a16:creationId xmlns:a16="http://schemas.microsoft.com/office/drawing/2014/main" id="{6611AF2D-6F85-491C-8B7A-72CE241EC38E}"/>
+              </a:ext>
+            </a:extLst>
+          </p:cNvPr>
           <p:cNvSpPr>
             <a:spLocks noGrp="1"/>
           </p:cNvSpPr>
@@ -1743,7 +1994,13 @@
       </p:sp>
       <p:sp>
         <p:nvSpPr>
-          <p:cNvPr id="5" name="Slide Number Placeholder 4"/>
+          <p:cNvPr id="5" name="Slide Number Placeholder 4">
+            <a:extLst>
+              <a:ext uri="{FF2B5EF4-FFF2-40B4-BE49-F238E27FC236}">
+                <a16:creationId xmlns:a16="http://schemas.microsoft.com/office/drawing/2014/main" id="{EEC7CAAD-6136-4E8A-86F4-4FC447AAF8BD}"/>
+              </a:ext>
+            </a:extLst>
+          </p:cNvPr>
           <p:cNvSpPr>
             <a:spLocks noGrp="1"/>
           </p:cNvSpPr>
@@ -1767,7 +2024,7 @@
     </p:spTree>
     <p:extLst>
       <p:ext uri="{BB962C8B-B14F-4D97-AF65-F5344CB8AC3E}">
-        <p14:creationId xmlns:p14="http://schemas.microsoft.com/office/powerpoint/2010/main" val="4170955725"/>
+        <p14:creationId xmlns:p14="http://schemas.microsoft.com/office/powerpoint/2010/main" val="2488344420"/>
       </p:ext>
     </p:extLst>
   </p:cSld>
@@ -1796,7 +2053,13 @@
       </p:grpSpPr>
       <p:sp>
         <p:nvSpPr>
-          <p:cNvPr id="2" name="Date Placeholder 1"/>
+          <p:cNvPr id="2" name="Date Placeholder 1">
+            <a:extLst>
+              <a:ext uri="{FF2B5EF4-FFF2-40B4-BE49-F238E27FC236}">
+                <a16:creationId xmlns:a16="http://schemas.microsoft.com/office/drawing/2014/main" id="{F58987C7-CBE8-483D-B958-F9EFEF6DEC52}"/>
+              </a:ext>
+            </a:extLst>
+          </p:cNvPr>
           <p:cNvSpPr>
             <a:spLocks noGrp="1"/>
           </p:cNvSpPr>
@@ -1819,7 +2082,13 @@
       </p:sp>
       <p:sp>
         <p:nvSpPr>
-          <p:cNvPr id="3" name="Footer Placeholder 2"/>
+          <p:cNvPr id="3" name="Footer Placeholder 2">
+            <a:extLst>
+              <a:ext uri="{FF2B5EF4-FFF2-40B4-BE49-F238E27FC236}">
+                <a16:creationId xmlns:a16="http://schemas.microsoft.com/office/drawing/2014/main" id="{76F7EA51-153C-409C-885D-D1A687D8585C}"/>
+              </a:ext>
+            </a:extLst>
+          </p:cNvPr>
           <p:cNvSpPr>
             <a:spLocks noGrp="1"/>
           </p:cNvSpPr>
@@ -1838,7 +2107,13 @@
       </p:sp>
       <p:sp>
         <p:nvSpPr>
-          <p:cNvPr id="4" name="Slide Number Placeholder 3"/>
+          <p:cNvPr id="4" name="Slide Number Placeholder 3">
+            <a:extLst>
+              <a:ext uri="{FF2B5EF4-FFF2-40B4-BE49-F238E27FC236}">
+                <a16:creationId xmlns:a16="http://schemas.microsoft.com/office/drawing/2014/main" id="{FCBE6014-E75B-46FF-8694-172BD1A1DD08}"/>
+              </a:ext>
+            </a:extLst>
+          </p:cNvPr>
           <p:cNvSpPr>
             <a:spLocks noGrp="1"/>
           </p:cNvSpPr>
@@ -1861,7 +2136,13 @@
       </p:sp>
       <p:pic>
         <p:nvPicPr>
-          <p:cNvPr id="5" name="Picture 4"/>
+          <p:cNvPr id="5" name="Picture 4">
+            <a:extLst>
+              <a:ext uri="{FF2B5EF4-FFF2-40B4-BE49-F238E27FC236}">
+                <a16:creationId xmlns:a16="http://schemas.microsoft.com/office/drawing/2014/main" id="{7B53257D-C498-4208-B14C-CE1ED2C6174E}"/>
+              </a:ext>
+            </a:extLst>
+          </p:cNvPr>
           <p:cNvPicPr>
             <a:picLocks noChangeAspect="1"/>
           </p:cNvPicPr>
@@ -1892,7 +2173,7 @@
     </p:spTree>
     <p:extLst>
       <p:ext uri="{BB962C8B-B14F-4D97-AF65-F5344CB8AC3E}">
-        <p14:creationId xmlns:p14="http://schemas.microsoft.com/office/powerpoint/2010/main" val="1495655884"/>
+        <p14:creationId xmlns:p14="http://schemas.microsoft.com/office/powerpoint/2010/main" val="2898813147"/>
       </p:ext>
     </p:extLst>
   </p:cSld>
@@ -1921,7 +2202,13 @@
       </p:grpSpPr>
       <p:sp>
         <p:nvSpPr>
-          <p:cNvPr id="2" name="Title 1"/>
+          <p:cNvPr id="2" name="Title 1">
+            <a:extLst>
+              <a:ext uri="{FF2B5EF4-FFF2-40B4-BE49-F238E27FC236}">
+                <a16:creationId xmlns:a16="http://schemas.microsoft.com/office/drawing/2014/main" id="{C4FA74F0-5DA6-4207-804A-10B89E2016F1}"/>
+              </a:ext>
+            </a:extLst>
+          </p:cNvPr>
           <p:cNvSpPr>
             <a:spLocks noGrp="1"/>
           </p:cNvSpPr>
@@ -1952,7 +2239,13 @@
       </p:sp>
       <p:sp>
         <p:nvSpPr>
-          <p:cNvPr id="3" name="Content Placeholder 2"/>
+          <p:cNvPr id="3" name="Content Placeholder 2">
+            <a:extLst>
+              <a:ext uri="{FF2B5EF4-FFF2-40B4-BE49-F238E27FC236}">
+                <a16:creationId xmlns:a16="http://schemas.microsoft.com/office/drawing/2014/main" id="{D96310F6-058B-4FFE-B907-85FCD02CF036}"/>
+              </a:ext>
+            </a:extLst>
+          </p:cNvPr>
           <p:cNvSpPr>
             <a:spLocks noGrp="1"/>
           </p:cNvSpPr>
@@ -2036,7 +2329,13 @@
       </p:sp>
       <p:sp>
         <p:nvSpPr>
-          <p:cNvPr id="4" name="Text Placeholder 3"/>
+          <p:cNvPr id="4" name="Text Placeholder 3">
+            <a:extLst>
+              <a:ext uri="{FF2B5EF4-FFF2-40B4-BE49-F238E27FC236}">
+                <a16:creationId xmlns:a16="http://schemas.microsoft.com/office/drawing/2014/main" id="{96A82E84-919F-450F-B799-03376792B5CD}"/>
+              </a:ext>
+            </a:extLst>
+          </p:cNvPr>
           <p:cNvSpPr>
             <a:spLocks noGrp="1"/>
           </p:cNvSpPr>
@@ -2101,7 +2400,13 @@
       </p:sp>
       <p:sp>
         <p:nvSpPr>
-          <p:cNvPr id="5" name="Date Placeholder 4"/>
+          <p:cNvPr id="5" name="Date Placeholder 4">
+            <a:extLst>
+              <a:ext uri="{FF2B5EF4-FFF2-40B4-BE49-F238E27FC236}">
+                <a16:creationId xmlns:a16="http://schemas.microsoft.com/office/drawing/2014/main" id="{8E27D708-BBCA-4531-AB0C-E612148D4B71}"/>
+              </a:ext>
+            </a:extLst>
+          </p:cNvPr>
           <p:cNvSpPr>
             <a:spLocks noGrp="1"/>
           </p:cNvSpPr>
@@ -2124,7 +2429,13 @@
       </p:sp>
       <p:sp>
         <p:nvSpPr>
-          <p:cNvPr id="6" name="Footer Placeholder 5"/>
+          <p:cNvPr id="6" name="Footer Placeholder 5">
+            <a:extLst>
+              <a:ext uri="{FF2B5EF4-FFF2-40B4-BE49-F238E27FC236}">
+                <a16:creationId xmlns:a16="http://schemas.microsoft.com/office/drawing/2014/main" id="{2E9149C8-44EA-428A-A711-1CFAB0D9850B}"/>
+              </a:ext>
+            </a:extLst>
+          </p:cNvPr>
           <p:cNvSpPr>
             <a:spLocks noGrp="1"/>
           </p:cNvSpPr>
@@ -2143,7 +2454,13 @@
       </p:sp>
       <p:sp>
         <p:nvSpPr>
-          <p:cNvPr id="7" name="Slide Number Placeholder 6"/>
+          <p:cNvPr id="7" name="Slide Number Placeholder 6">
+            <a:extLst>
+              <a:ext uri="{FF2B5EF4-FFF2-40B4-BE49-F238E27FC236}">
+                <a16:creationId xmlns:a16="http://schemas.microsoft.com/office/drawing/2014/main" id="{B1C180DA-0CA4-4146-B823-80EB6FFDE40A}"/>
+              </a:ext>
+            </a:extLst>
+          </p:cNvPr>
           <p:cNvSpPr>
             <a:spLocks noGrp="1"/>
           </p:cNvSpPr>
@@ -2167,7 +2484,7 @@
     </p:spTree>
     <p:extLst>
       <p:ext uri="{BB962C8B-B14F-4D97-AF65-F5344CB8AC3E}">
-        <p14:creationId xmlns:p14="http://schemas.microsoft.com/office/powerpoint/2010/main" val="3713314883"/>
+        <p14:creationId xmlns:p14="http://schemas.microsoft.com/office/powerpoint/2010/main" val="1372577233"/>
       </p:ext>
     </p:extLst>
   </p:cSld>
@@ -2196,7 +2513,13 @@
       </p:grpSpPr>
       <p:sp>
         <p:nvSpPr>
-          <p:cNvPr id="2" name="Title 1"/>
+          <p:cNvPr id="2" name="Title 1">
+            <a:extLst>
+              <a:ext uri="{FF2B5EF4-FFF2-40B4-BE49-F238E27FC236}">
+                <a16:creationId xmlns:a16="http://schemas.microsoft.com/office/drawing/2014/main" id="{81629368-F6DA-49C4-89E3-284514B484F6}"/>
+              </a:ext>
+            </a:extLst>
+          </p:cNvPr>
           <p:cNvSpPr>
             <a:spLocks noGrp="1"/>
           </p:cNvSpPr>
@@ -2227,7 +2550,13 @@
       </p:sp>
       <p:sp>
         <p:nvSpPr>
-          <p:cNvPr id="3" name="Picture Placeholder 2"/>
+          <p:cNvPr id="3" name="Picture Placeholder 2">
+            <a:extLst>
+              <a:ext uri="{FF2B5EF4-FFF2-40B4-BE49-F238E27FC236}">
+                <a16:creationId xmlns:a16="http://schemas.microsoft.com/office/drawing/2014/main" id="{E9779A7C-44E1-4612-90A9-5858D6427459}"/>
+              </a:ext>
+            </a:extLst>
+          </p:cNvPr>
           <p:cNvSpPr>
             <a:spLocks noGrp="1"/>
           </p:cNvSpPr>
@@ -2288,7 +2617,13 @@
       </p:sp>
       <p:sp>
         <p:nvSpPr>
-          <p:cNvPr id="4" name="Text Placeholder 3"/>
+          <p:cNvPr id="4" name="Text Placeholder 3">
+            <a:extLst>
+              <a:ext uri="{FF2B5EF4-FFF2-40B4-BE49-F238E27FC236}">
+                <a16:creationId xmlns:a16="http://schemas.microsoft.com/office/drawing/2014/main" id="{94AEDF4B-55A2-4E96-824C-483E6AF00D1B}"/>
+              </a:ext>
+            </a:extLst>
+          </p:cNvPr>
           <p:cNvSpPr>
             <a:spLocks noGrp="1"/>
           </p:cNvSpPr>
@@ -2353,7 +2688,13 @@
       </p:sp>
       <p:sp>
         <p:nvSpPr>
-          <p:cNvPr id="5" name="Date Placeholder 4"/>
+          <p:cNvPr id="5" name="Date Placeholder 4">
+            <a:extLst>
+              <a:ext uri="{FF2B5EF4-FFF2-40B4-BE49-F238E27FC236}">
+                <a16:creationId xmlns:a16="http://schemas.microsoft.com/office/drawing/2014/main" id="{BBB7E4CE-42EA-401F-8DC7-71E36DE9CEFF}"/>
+              </a:ext>
+            </a:extLst>
+          </p:cNvPr>
           <p:cNvSpPr>
             <a:spLocks noGrp="1"/>
           </p:cNvSpPr>
@@ -2376,7 +2717,13 @@
       </p:sp>
       <p:sp>
         <p:nvSpPr>
-          <p:cNvPr id="6" name="Footer Placeholder 5"/>
+          <p:cNvPr id="6" name="Footer Placeholder 5">
+            <a:extLst>
+              <a:ext uri="{FF2B5EF4-FFF2-40B4-BE49-F238E27FC236}">
+                <a16:creationId xmlns:a16="http://schemas.microsoft.com/office/drawing/2014/main" id="{B3647534-7EA0-451D-BF4E-8A08E5D82209}"/>
+              </a:ext>
+            </a:extLst>
+          </p:cNvPr>
           <p:cNvSpPr>
             <a:spLocks noGrp="1"/>
           </p:cNvSpPr>
@@ -2389,13 +2736,19 @@
           <a:bodyPr/>
           <a:lstStyle/>
           <a:p>
-            <a:endParaRPr lang="en-US"/>
-          </a:p>
-        </p:txBody>
-      </p:sp>
-      <p:sp>
-        <p:nvSpPr>
-          <p:cNvPr id="7" name="Slide Number Placeholder 6"/>
+            <a:endParaRPr lang="en-US" dirty="0"/>
+          </a:p>
+        </p:txBody>
+      </p:sp>
+      <p:sp>
+        <p:nvSpPr>
+          <p:cNvPr id="7" name="Slide Number Placeholder 6">
+            <a:extLst>
+              <a:ext uri="{FF2B5EF4-FFF2-40B4-BE49-F238E27FC236}">
+                <a16:creationId xmlns:a16="http://schemas.microsoft.com/office/drawing/2014/main" id="{8B57AC24-84D4-4ADA-B452-3A469FC942A3}"/>
+              </a:ext>
+            </a:extLst>
+          </p:cNvPr>
           <p:cNvSpPr>
             <a:spLocks noGrp="1"/>
           </p:cNvSpPr>
@@ -2419,7 +2772,7 @@
     </p:spTree>
     <p:extLst>
       <p:ext uri="{BB962C8B-B14F-4D97-AF65-F5344CB8AC3E}">
-        <p14:creationId xmlns:p14="http://schemas.microsoft.com/office/powerpoint/2010/main" val="4183756318"/>
+        <p14:creationId xmlns:p14="http://schemas.microsoft.com/office/powerpoint/2010/main" val="4078711309"/>
       </p:ext>
     </p:extLst>
   </p:cSld>
@@ -2453,7 +2806,13 @@
       </p:grpSpPr>
       <p:sp>
         <p:nvSpPr>
-          <p:cNvPr id="2" name="Title Placeholder 1"/>
+          <p:cNvPr id="2" name="Title Placeholder 1">
+            <a:extLst>
+              <a:ext uri="{FF2B5EF4-FFF2-40B4-BE49-F238E27FC236}">
+                <a16:creationId xmlns:a16="http://schemas.microsoft.com/office/drawing/2014/main" id="{721DC9E4-9B5D-4A2D-8B78-5E51E9FEEAE1}"/>
+              </a:ext>
+            </a:extLst>
+          </p:cNvPr>
           <p:cNvSpPr>
             <a:spLocks noGrp="1"/>
           </p:cNvSpPr>
@@ -2485,7 +2844,13 @@
       </p:sp>
       <p:sp>
         <p:nvSpPr>
-          <p:cNvPr id="3" name="Text Placeholder 2"/>
+          <p:cNvPr id="3" name="Text Placeholder 2">
+            <a:extLst>
+              <a:ext uri="{FF2B5EF4-FFF2-40B4-BE49-F238E27FC236}">
+                <a16:creationId xmlns:a16="http://schemas.microsoft.com/office/drawing/2014/main" id="{5F875595-7E5A-4543-8012-27FF5E8C0382}"/>
+              </a:ext>
+            </a:extLst>
+          </p:cNvPr>
           <p:cNvSpPr>
             <a:spLocks noGrp="1"/>
           </p:cNvSpPr>
@@ -2546,7 +2911,13 @@
       </p:sp>
       <p:sp>
         <p:nvSpPr>
-          <p:cNvPr id="4" name="Date Placeholder 3"/>
+          <p:cNvPr id="4" name="Date Placeholder 3">
+            <a:extLst>
+              <a:ext uri="{FF2B5EF4-FFF2-40B4-BE49-F238E27FC236}">
+                <a16:creationId xmlns:a16="http://schemas.microsoft.com/office/drawing/2014/main" id="{F726F894-04CA-4FEA-8AC5-A1A97E52FA4B}"/>
+              </a:ext>
+            </a:extLst>
+          </p:cNvPr>
           <p:cNvSpPr>
             <a:spLocks noGrp="1"/>
           </p:cNvSpPr>
@@ -2587,7 +2958,13 @@
       </p:sp>
       <p:sp>
         <p:nvSpPr>
-          <p:cNvPr id="5" name="Footer Placeholder 4"/>
+          <p:cNvPr id="5" name="Footer Placeholder 4">
+            <a:extLst>
+              <a:ext uri="{FF2B5EF4-FFF2-40B4-BE49-F238E27FC236}">
+                <a16:creationId xmlns:a16="http://schemas.microsoft.com/office/drawing/2014/main" id="{9905FE26-EF46-445B-86AF-BC20405834A5}"/>
+              </a:ext>
+            </a:extLst>
+          </p:cNvPr>
           <p:cNvSpPr>
             <a:spLocks noGrp="1"/>
           </p:cNvSpPr>
@@ -2624,7 +3001,13 @@
       </p:sp>
       <p:sp>
         <p:nvSpPr>
-          <p:cNvPr id="6" name="Slide Number Placeholder 5"/>
+          <p:cNvPr id="6" name="Slide Number Placeholder 5">
+            <a:extLst>
+              <a:ext uri="{FF2B5EF4-FFF2-40B4-BE49-F238E27FC236}">
+                <a16:creationId xmlns:a16="http://schemas.microsoft.com/office/drawing/2014/main" id="{EF5BD962-B799-467A-86E9-55D2B403BCA2}"/>
+              </a:ext>
+            </a:extLst>
+          </p:cNvPr>
           <p:cNvSpPr>
             <a:spLocks noGrp="1"/>
           </p:cNvSpPr>
@@ -2666,23 +3049,23 @@
     </p:spTree>
     <p:extLst>
       <p:ext uri="{BB962C8B-B14F-4D97-AF65-F5344CB8AC3E}">
-        <p14:creationId xmlns:p14="http://schemas.microsoft.com/office/powerpoint/2010/main" val="2114356458"/>
+        <p14:creationId xmlns:p14="http://schemas.microsoft.com/office/powerpoint/2010/main" val="1250427915"/>
       </p:ext>
     </p:extLst>
   </p:cSld>
   <p:clrMap bg1="lt1" tx1="dk1" bg2="lt2" tx2="dk2" accent1="accent1" accent2="accent2" accent3="accent3" accent4="accent4" accent5="accent5" accent6="accent6" hlink="hlink" folHlink="folHlink"/>
   <p:sldLayoutIdLst>
-    <p:sldLayoutId id="2147483649" r:id="rId1"/>
-    <p:sldLayoutId id="2147483650" r:id="rId2"/>
-    <p:sldLayoutId id="2147483651" r:id="rId3"/>
-    <p:sldLayoutId id="2147483652" r:id="rId4"/>
-    <p:sldLayoutId id="2147483653" r:id="rId5"/>
-    <p:sldLayoutId id="2147483654" r:id="rId6"/>
-    <p:sldLayoutId id="2147483655" r:id="rId7"/>
-    <p:sldLayoutId id="2147483656" r:id="rId8"/>
-    <p:sldLayoutId id="2147483657" r:id="rId9"/>
-    <p:sldLayoutId id="2147483658" r:id="rId10"/>
-    <p:sldLayoutId id="2147483659" r:id="rId11"/>
+    <p:sldLayoutId id="2147483769" r:id="rId1"/>
+    <p:sldLayoutId id="2147483770" r:id="rId2"/>
+    <p:sldLayoutId id="2147483771" r:id="rId3"/>
+    <p:sldLayoutId id="2147483772" r:id="rId4"/>
+    <p:sldLayoutId id="2147483773" r:id="rId5"/>
+    <p:sldLayoutId id="2147483774" r:id="rId6"/>
+    <p:sldLayoutId id="2147483775" r:id="rId7"/>
+    <p:sldLayoutId id="2147483776" r:id="rId8"/>
+    <p:sldLayoutId id="2147483777" r:id="rId9"/>
+    <p:sldLayoutId id="2147483778" r:id="rId10"/>
+    <p:sldLayoutId id="2147483779" r:id="rId11"/>
   </p:sldLayoutIdLst>
   <p:txStyles>
     <p:titleStyle>
@@ -2970,6 +3353,14 @@
 <file path=ppt/slides/slide1.xml><?xml version="1.0" encoding="utf-8"?>
 <p:sld xmlns:a="http://schemas.openxmlformats.org/drawingml/2006/main" xmlns:r="http://schemas.openxmlformats.org/officeDocument/2006/relationships" xmlns:p="http://schemas.openxmlformats.org/presentationml/2006/main">
   <p:cSld>
+    <p:bg>
+      <p:bgPr>
+        <a:solidFill>
+          <a:srgbClr val="606060"/>
+        </a:solidFill>
+        <a:effectLst/>
+      </p:bgPr>
+    </p:bg>
     <p:spTree>
       <p:nvGrpSpPr>
         <p:cNvPr id="1" name=""/>
@@ -2994,14 +3385,25 @@
             <p:ph type="ctrTitle"/>
           </p:nvPr>
         </p:nvSpPr>
-        <p:spPr/>
-        <p:txBody>
-          <a:bodyPr/>
-          <a:lstStyle/>
-          <a:p>
-            <a:r>
-              <a:rPr lang="en-US" dirty="0"/>
-              <a:t>Meghana Tour Mockup</a:t>
+        <p:spPr>
+          <a:xfrm>
+            <a:off x="1524000" y="1517515"/>
+            <a:ext cx="9144000" cy="1525520"/>
+          </a:xfrm>
+        </p:spPr>
+        <p:txBody>
+          <a:bodyPr>
+            <a:normAutofit fontScale="90000"/>
+          </a:bodyPr>
+          <a:lstStyle/>
+          <a:p>
+            <a:r>
+              <a:rPr lang="en-US" b="1" dirty="0">
+                <a:solidFill>
+                  <a:schemeClr val="bg1"/>
+                </a:solidFill>
+              </a:rPr>
+              <a:t>Mockup Tour of Creating a New Artboard in Adobe Illustrator</a:t>
             </a:r>
           </a:p>
         </p:txBody>
@@ -3016,12 +3418,36 @@
             <p:ph type="subTitle" idx="1"/>
           </p:nvPr>
         </p:nvSpPr>
-        <p:spPr/>
-        <p:txBody>
-          <a:bodyPr/>
-          <a:lstStyle/>
-          <a:p>
-            <a:endParaRPr lang="en-US"/>
+        <p:spPr>
+          <a:xfrm>
+            <a:off x="3954889" y="3602038"/>
+            <a:ext cx="4282222" cy="775409"/>
+          </a:xfrm>
+        </p:spPr>
+        <p:txBody>
+          <a:bodyPr>
+            <a:normAutofit fontScale="92500" lnSpcReduction="10000"/>
+          </a:bodyPr>
+          <a:lstStyle/>
+          <a:p>
+            <a:r>
+              <a:rPr lang="en-US" dirty="0">
+                <a:solidFill>
+                  <a:schemeClr val="bg1"/>
+                </a:solidFill>
+              </a:rPr>
+              <a:t>Meghana Arvind</a:t>
+            </a:r>
+          </a:p>
+          <a:p>
+            <a:r>
+              <a:rPr lang="en-US" dirty="0">
+                <a:solidFill>
+                  <a:schemeClr val="bg1"/>
+                </a:solidFill>
+              </a:rPr>
+              <a:t>MCC Tech Writing Spring 2020</a:t>
+            </a:r>
           </a:p>
         </p:txBody>
       </p:sp>
@@ -3249,7 +3675,7 @@
           <a:p>
             <a:pPr algn="ctr"/>
             <a:r>
-              <a:rPr lang="en-US" sz="2400" dirty="0"/>
+              <a:rPr lang="en-US" sz="2400" b="1" dirty="0"/>
               <a:t>Artboard</a:t>
             </a:r>
           </a:p>
@@ -3321,7 +3747,7 @@
           <a:p>
             <a:pPr algn="ctr"/>
             <a:r>
-              <a:rPr lang="en-US" sz="1200" dirty="0"/>
+              <a:rPr lang="en-US" sz="1200" b="1" i="1" dirty="0"/>
               <a:t>next</a:t>
             </a:r>
           </a:p>
@@ -3357,7 +3783,7 @@
           <a:p>
             <a:pPr algn="ctr"/>
             <a:r>
-              <a:rPr lang="en-US" sz="1200" dirty="0"/>
+              <a:rPr lang="en-US" sz="1200" b="1" i="1" dirty="0"/>
               <a:t>end</a:t>
             </a:r>
           </a:p>
@@ -3655,8 +4081,8 @@
           <a:p>
             <a:pPr algn="ctr"/>
             <a:r>
-              <a:rPr lang="en-US" sz="2400" dirty="0"/>
-              <a:t>Artboards</a:t>
+              <a:rPr lang="en-US" sz="2400" b="1" dirty="0"/>
+              <a:t>Artboard</a:t>
             </a:r>
           </a:p>
         </p:txBody>
@@ -3691,7 +4117,7 @@
           <a:p>
             <a:pPr algn="ctr"/>
             <a:r>
-              <a:rPr lang="en-US" sz="1200" dirty="0"/>
+              <a:rPr lang="en-US" sz="1200" b="1" i="1" dirty="0"/>
               <a:t>back</a:t>
             </a:r>
           </a:p>
@@ -3727,7 +4153,7 @@
           <a:p>
             <a:pPr algn="ctr"/>
             <a:r>
-              <a:rPr lang="en-US" sz="1200" dirty="0"/>
+              <a:rPr lang="en-US" sz="1200" b="1" i="1" dirty="0"/>
               <a:t>next</a:t>
             </a:r>
           </a:p>
@@ -3763,7 +4189,7 @@
           <a:p>
             <a:pPr algn="ctr"/>
             <a:r>
-              <a:rPr lang="en-US" sz="1200" dirty="0"/>
+              <a:rPr lang="en-US" sz="1200" b="1" i="1" dirty="0"/>
               <a:t>end</a:t>
             </a:r>
           </a:p>
@@ -3784,7 +4210,7 @@
         <p:spPr>
           <a:xfrm>
             <a:off x="758169" y="3318265"/>
-            <a:ext cx="2638780" cy="1015663"/>
+            <a:ext cx="2638780" cy="1200329"/>
           </a:xfrm>
           <a:prstGeom prst="rect">
             <a:avLst/>
@@ -3835,7 +4261,15 @@
             </a:r>
             <a:r>
               <a:rPr lang="en-US" sz="1200" dirty="0"/>
-              <a:t>for the next step.</a:t>
+              <a:t>for the next step or press </a:t>
+            </a:r>
+            <a:r>
+              <a:rPr lang="en-US" sz="1200" b="1" dirty="0"/>
+              <a:t>back </a:t>
+            </a:r>
+            <a:r>
+              <a:rPr lang="en-US" sz="1200" dirty="0"/>
+              <a:t>to go to a previous step.</a:t>
             </a:r>
             <a:endParaRPr lang="en-US" sz="1200" b="1" dirty="0"/>
           </a:p>
@@ -3865,6 +4299,14 @@
 <file path=ppt/slides/slide4.xml><?xml version="1.0" encoding="utf-8"?>
 <p:sld xmlns:a="http://schemas.openxmlformats.org/drawingml/2006/main" xmlns:r="http://schemas.openxmlformats.org/officeDocument/2006/relationships" xmlns:p="http://schemas.openxmlformats.org/presentationml/2006/main">
   <p:cSld>
+    <p:bg>
+      <p:bgPr>
+        <a:solidFill>
+          <a:srgbClr val="606060"/>
+        </a:solidFill>
+        <a:effectLst/>
+      </p:bgPr>
+    </p:bg>
     <p:spTree>
       <p:nvGrpSpPr>
         <p:cNvPr id="1" name=""/>
@@ -4145,8 +4587,8 @@
           <a:p>
             <a:pPr algn="ctr"/>
             <a:r>
-              <a:rPr lang="en-US" sz="2400" dirty="0"/>
-              <a:t>Artboards</a:t>
+              <a:rPr lang="en-US" sz="2400" b="1" dirty="0"/>
+              <a:t>Artboard</a:t>
             </a:r>
           </a:p>
         </p:txBody>
@@ -4181,7 +4623,7 @@
           <a:p>
             <a:pPr algn="ctr"/>
             <a:r>
-              <a:rPr lang="en-US" sz="1200" dirty="0"/>
+              <a:rPr lang="en-US" sz="1200" b="1" i="1" dirty="0"/>
               <a:t>back</a:t>
             </a:r>
           </a:p>
@@ -4217,7 +4659,7 @@
           <a:p>
             <a:pPr algn="ctr"/>
             <a:r>
-              <a:rPr lang="en-US" sz="1200" dirty="0"/>
+              <a:rPr lang="en-US" sz="1200" b="1" i="1" dirty="0"/>
               <a:t>next</a:t>
             </a:r>
           </a:p>
@@ -4253,7 +4695,7 @@
           <a:p>
             <a:pPr algn="ctr"/>
             <a:r>
-              <a:rPr lang="en-US" sz="1200" dirty="0"/>
+              <a:rPr lang="en-US" sz="1200" b="1" i="1" dirty="0"/>
               <a:t>end</a:t>
             </a:r>
           </a:p>
@@ -4274,7 +4716,7 @@
         <p:spPr>
           <a:xfrm>
             <a:off x="7580310" y="781276"/>
-            <a:ext cx="2638780" cy="1015663"/>
+            <a:ext cx="2638780" cy="1200329"/>
           </a:xfrm>
           <a:prstGeom prst="rect">
             <a:avLst/>
@@ -4330,7 +4772,15 @@
             </a:r>
             <a:r>
               <a:rPr lang="en-US" sz="1200" dirty="0"/>
-              <a:t>for the next step.</a:t>
+              <a:t>for the next step or press </a:t>
+            </a:r>
+            <a:r>
+              <a:rPr lang="en-US" sz="1200" b="1" dirty="0"/>
+              <a:t>back </a:t>
+            </a:r>
+            <a:r>
+              <a:rPr lang="en-US" sz="1200" dirty="0"/>
+              <a:t>to go to a previous step.</a:t>
             </a:r>
             <a:endParaRPr lang="en-US" sz="1200" b="1" dirty="0"/>
           </a:p>
@@ -4376,10 +4826,10 @@
       </p:grpSpPr>
       <p:pic>
         <p:nvPicPr>
-          <p:cNvPr id="2" name="Picture 1">
-            <a:extLst>
-              <a:ext uri="{FF2B5EF4-FFF2-40B4-BE49-F238E27FC236}">
-                <a16:creationId xmlns:a16="http://schemas.microsoft.com/office/drawing/2014/main" id="{6E48F301-D28F-475A-AAB9-F474077E5A4C}"/>
+          <p:cNvPr id="3" name="Picture 2">
+            <a:extLst>
+              <a:ext uri="{FF2B5EF4-FFF2-40B4-BE49-F238E27FC236}">
+                <a16:creationId xmlns:a16="http://schemas.microsoft.com/office/drawing/2014/main" id="{2DE75250-3CBD-4181-932D-8F20CF67A199}"/>
               </a:ext>
             </a:extLst>
           </p:cNvPr>
@@ -4396,14 +4846,360 @@
         </p:blipFill>
         <p:spPr>
           <a:xfrm>
-            <a:off x="0" y="-194554"/>
-            <a:ext cx="12192000" cy="7052553"/>
+            <a:off x="0" y="-80682"/>
+            <a:ext cx="12192000" cy="6697777"/>
           </a:xfrm>
           <a:prstGeom prst="rect">
             <a:avLst/>
           </a:prstGeom>
         </p:spPr>
       </p:pic>
+      <p:sp>
+        <p:nvSpPr>
+          <p:cNvPr id="11" name="Arrow: Bent-Up 10">
+            <a:extLst>
+              <a:ext uri="{FF2B5EF4-FFF2-40B4-BE49-F238E27FC236}">
+                <a16:creationId xmlns:a16="http://schemas.microsoft.com/office/drawing/2014/main" id="{134CB8FA-AD4F-4A22-B913-7202278F6E53}"/>
+              </a:ext>
+            </a:extLst>
+          </p:cNvPr>
+          <p:cNvSpPr/>
+          <p:nvPr/>
+        </p:nvSpPr>
+        <p:spPr>
+          <a:xfrm>
+            <a:off x="8089501" y="5009712"/>
+            <a:ext cx="1513983" cy="1302350"/>
+          </a:xfrm>
+          <a:prstGeom prst="bentUpArrow">
+            <a:avLst/>
+          </a:prstGeom>
+          <a:ln>
+            <a:noFill/>
+          </a:ln>
+          <a:effectLst>
+            <a:outerShdw blurRad="190500" dist="228600" dir="2700000" algn="ctr">
+              <a:srgbClr val="000000">
+                <a:alpha val="30000"/>
+              </a:srgbClr>
+            </a:outerShdw>
+          </a:effectLst>
+          <a:scene3d>
+            <a:camera prst="orthographicFront">
+              <a:rot lat="0" lon="0" rev="0"/>
+            </a:camera>
+            <a:lightRig rig="glow" dir="t">
+              <a:rot lat="0" lon="0" rev="4800000"/>
+            </a:lightRig>
+          </a:scene3d>
+          <a:sp3d prstMaterial="matte">
+            <a:bevelT w="127000" h="63500"/>
+          </a:sp3d>
+        </p:spPr>
+        <p:style>
+          <a:lnRef idx="2">
+            <a:schemeClr val="accent1">
+              <a:shade val="50000"/>
+            </a:schemeClr>
+          </a:lnRef>
+          <a:fillRef idx="1">
+            <a:schemeClr val="accent1"/>
+          </a:fillRef>
+          <a:effectRef idx="0">
+            <a:schemeClr val="accent1"/>
+          </a:effectRef>
+          <a:fontRef idx="minor">
+            <a:schemeClr val="lt1"/>
+          </a:fontRef>
+        </p:style>
+        <p:txBody>
+          <a:bodyPr rtlCol="0" anchor="ctr"/>
+          <a:lstStyle/>
+          <a:p>
+            <a:pPr algn="ctr"/>
+            <a:endParaRPr lang="en-US"/>
+          </a:p>
+        </p:txBody>
+      </p:sp>
+      <p:sp>
+        <p:nvSpPr>
+          <p:cNvPr id="5" name="TextBox 4">
+            <a:extLst>
+              <a:ext uri="{FF2B5EF4-FFF2-40B4-BE49-F238E27FC236}">
+                <a16:creationId xmlns:a16="http://schemas.microsoft.com/office/drawing/2014/main" id="{547E25D3-34AE-48A6-9FDB-BF8EC0511CC4}"/>
+              </a:ext>
+            </a:extLst>
+          </p:cNvPr>
+          <p:cNvSpPr txBox="1"/>
+          <p:nvPr/>
+        </p:nvSpPr>
+        <p:spPr>
+          <a:xfrm>
+            <a:off x="5932720" y="4424183"/>
+            <a:ext cx="2638780" cy="1958786"/>
+          </a:xfrm>
+          <a:prstGeom prst="rect">
+            <a:avLst/>
+          </a:prstGeom>
+          <a:solidFill>
+            <a:srgbClr val="5B9BD5"/>
+          </a:solidFill>
+          <a:ln>
+            <a:noFill/>
+          </a:ln>
+          <a:effectLst>
+            <a:outerShdw blurRad="190500" dist="228600" dir="2700000" algn="ctr">
+              <a:srgbClr val="000000">
+                <a:alpha val="30000"/>
+              </a:srgbClr>
+            </a:outerShdw>
+          </a:effectLst>
+          <a:scene3d>
+            <a:camera prst="orthographicFront">
+              <a:rot lat="0" lon="0" rev="0"/>
+            </a:camera>
+            <a:lightRig rig="glow" dir="t">
+              <a:rot lat="0" lon="0" rev="4800000"/>
+            </a:lightRig>
+          </a:scene3d>
+          <a:sp3d prstMaterial="matte">
+            <a:bevelT w="127000" h="63500"/>
+          </a:sp3d>
+        </p:spPr>
+        <p:txBody>
+          <a:bodyPr wrap="square" rtlCol="0">
+            <a:spAutoFit/>
+          </a:bodyPr>
+          <a:lstStyle/>
+          <a:p>
+            <a:endParaRPr lang="en-US" dirty="0"/>
+          </a:p>
+        </p:txBody>
+      </p:sp>
+      <p:sp>
+        <p:nvSpPr>
+          <p:cNvPr id="6" name="TextBox 5">
+            <a:extLst>
+              <a:ext uri="{FF2B5EF4-FFF2-40B4-BE49-F238E27FC236}">
+                <a16:creationId xmlns:a16="http://schemas.microsoft.com/office/drawing/2014/main" id="{68CEE4D3-39BC-4226-915B-1B2617A08A0D}"/>
+              </a:ext>
+            </a:extLst>
+          </p:cNvPr>
+          <p:cNvSpPr txBox="1"/>
+          <p:nvPr/>
+        </p:nvSpPr>
+        <p:spPr>
+          <a:xfrm>
+            <a:off x="6391498" y="4447483"/>
+            <a:ext cx="1721223" cy="461665"/>
+          </a:xfrm>
+          <a:prstGeom prst="rect">
+            <a:avLst/>
+          </a:prstGeom>
+          <a:noFill/>
+        </p:spPr>
+        <p:txBody>
+          <a:bodyPr wrap="square" rtlCol="0">
+            <a:spAutoFit/>
+          </a:bodyPr>
+          <a:lstStyle/>
+          <a:p>
+            <a:pPr algn="ctr"/>
+            <a:r>
+              <a:rPr lang="en-US" sz="2400" b="1" dirty="0"/>
+              <a:t>Artboard</a:t>
+            </a:r>
+          </a:p>
+        </p:txBody>
+      </p:sp>
+      <p:sp>
+        <p:nvSpPr>
+          <p:cNvPr id="7" name="TextBox 6">
+            <a:extLst>
+              <a:ext uri="{FF2B5EF4-FFF2-40B4-BE49-F238E27FC236}">
+                <a16:creationId xmlns:a16="http://schemas.microsoft.com/office/drawing/2014/main" id="{360B9631-4277-4ECF-A6F3-D3F7F0D06718}"/>
+              </a:ext>
+            </a:extLst>
+          </p:cNvPr>
+          <p:cNvSpPr txBox="1"/>
+          <p:nvPr/>
+        </p:nvSpPr>
+        <p:spPr>
+          <a:xfrm>
+            <a:off x="5932720" y="6087964"/>
+            <a:ext cx="562979" cy="276999"/>
+          </a:xfrm>
+          <a:prstGeom prst="rect">
+            <a:avLst/>
+          </a:prstGeom>
+          <a:noFill/>
+        </p:spPr>
+        <p:txBody>
+          <a:bodyPr wrap="square" rtlCol="0">
+            <a:spAutoFit/>
+          </a:bodyPr>
+          <a:lstStyle/>
+          <a:p>
+            <a:pPr algn="ctr"/>
+            <a:r>
+              <a:rPr lang="en-US" sz="1200" b="1" i="1" dirty="0"/>
+              <a:t>back</a:t>
+            </a:r>
+          </a:p>
+        </p:txBody>
+      </p:sp>
+      <p:sp>
+        <p:nvSpPr>
+          <p:cNvPr id="8" name="TextBox 7">
+            <a:extLst>
+              <a:ext uri="{FF2B5EF4-FFF2-40B4-BE49-F238E27FC236}">
+                <a16:creationId xmlns:a16="http://schemas.microsoft.com/office/drawing/2014/main" id="{D1216E75-79B7-47FF-A7FE-2FF4FEF83DFB}"/>
+              </a:ext>
+            </a:extLst>
+          </p:cNvPr>
+          <p:cNvSpPr txBox="1"/>
+          <p:nvPr/>
+        </p:nvSpPr>
+        <p:spPr>
+          <a:xfrm>
+            <a:off x="6986634" y="6066004"/>
+            <a:ext cx="562979" cy="276999"/>
+          </a:xfrm>
+          <a:prstGeom prst="rect">
+            <a:avLst/>
+          </a:prstGeom>
+          <a:noFill/>
+        </p:spPr>
+        <p:txBody>
+          <a:bodyPr wrap="square" rtlCol="0">
+            <a:spAutoFit/>
+          </a:bodyPr>
+          <a:lstStyle/>
+          <a:p>
+            <a:pPr algn="ctr"/>
+            <a:r>
+              <a:rPr lang="en-US" sz="1200" b="1" i="1" dirty="0"/>
+              <a:t>next</a:t>
+            </a:r>
+          </a:p>
+        </p:txBody>
+      </p:sp>
+      <p:sp>
+        <p:nvSpPr>
+          <p:cNvPr id="9" name="TextBox 8">
+            <a:extLst>
+              <a:ext uri="{FF2B5EF4-FFF2-40B4-BE49-F238E27FC236}">
+                <a16:creationId xmlns:a16="http://schemas.microsoft.com/office/drawing/2014/main" id="{43AAFD56-1322-461F-ABB4-EF7B07B455E5}"/>
+              </a:ext>
+            </a:extLst>
+          </p:cNvPr>
+          <p:cNvSpPr txBox="1"/>
+          <p:nvPr/>
+        </p:nvSpPr>
+        <p:spPr>
+          <a:xfrm>
+            <a:off x="8067570" y="6061145"/>
+            <a:ext cx="420563" cy="276999"/>
+          </a:xfrm>
+          <a:prstGeom prst="rect">
+            <a:avLst/>
+          </a:prstGeom>
+          <a:noFill/>
+        </p:spPr>
+        <p:txBody>
+          <a:bodyPr wrap="square" rtlCol="0">
+            <a:spAutoFit/>
+          </a:bodyPr>
+          <a:lstStyle/>
+          <a:p>
+            <a:pPr algn="ctr"/>
+            <a:r>
+              <a:rPr lang="en-US" sz="1200" b="1" i="1" dirty="0"/>
+              <a:t>end</a:t>
+            </a:r>
+          </a:p>
+        </p:txBody>
+      </p:sp>
+      <p:sp>
+        <p:nvSpPr>
+          <p:cNvPr id="10" name="TextBox 9">
+            <a:extLst>
+              <a:ext uri="{FF2B5EF4-FFF2-40B4-BE49-F238E27FC236}">
+                <a16:creationId xmlns:a16="http://schemas.microsoft.com/office/drawing/2014/main" id="{7A994CB0-E3E8-41FB-B39F-8D6679A1534E}"/>
+              </a:ext>
+            </a:extLst>
+          </p:cNvPr>
+          <p:cNvSpPr txBox="1"/>
+          <p:nvPr/>
+        </p:nvSpPr>
+        <p:spPr>
+          <a:xfrm>
+            <a:off x="5948734" y="4909148"/>
+            <a:ext cx="2638780" cy="1384995"/>
+          </a:xfrm>
+          <a:prstGeom prst="rect">
+            <a:avLst/>
+          </a:prstGeom>
+          <a:noFill/>
+        </p:spPr>
+        <p:txBody>
+          <a:bodyPr wrap="square" rtlCol="0">
+            <a:spAutoFit/>
+          </a:bodyPr>
+          <a:lstStyle/>
+          <a:p>
+            <a:r>
+              <a:rPr lang="en-US" sz="1200" dirty="0"/>
+              <a:t>Clicking “</a:t>
+            </a:r>
+            <a:r>
+              <a:rPr lang="en-US" sz="1200" b="1" dirty="0"/>
+              <a:t>New Artboard</a:t>
+            </a:r>
+            <a:r>
+              <a:rPr lang="en-US" sz="1200" dirty="0"/>
+              <a:t>” in the “</a:t>
+            </a:r>
+            <a:r>
+              <a:rPr lang="en-US" sz="1200" b="1" dirty="0"/>
+              <a:t>Artboard</a:t>
+            </a:r>
+            <a:r>
+              <a:rPr lang="en-US" sz="1200" dirty="0"/>
+              <a:t>” panel creates a new artboard. </a:t>
+            </a:r>
+          </a:p>
+          <a:p>
+            <a:endParaRPr lang="en-US" sz="1200" dirty="0"/>
+          </a:p>
+          <a:p>
+            <a:r>
+              <a:rPr lang="en-US" sz="1200" dirty="0"/>
+              <a:t>Press </a:t>
+            </a:r>
+            <a:r>
+              <a:rPr lang="en-US" sz="1200" b="1" dirty="0"/>
+              <a:t>next </a:t>
+            </a:r>
+            <a:r>
+              <a:rPr lang="en-US" sz="1200" dirty="0"/>
+              <a:t>for the next step or press </a:t>
+            </a:r>
+            <a:r>
+              <a:rPr lang="en-US" sz="1200" b="1" dirty="0"/>
+              <a:t>back </a:t>
+            </a:r>
+            <a:r>
+              <a:rPr lang="en-US" sz="1200" dirty="0"/>
+              <a:t>to go to a previous step.</a:t>
+            </a:r>
+            <a:endParaRPr lang="en-US" sz="1200" b="1" dirty="0"/>
+          </a:p>
+          <a:p>
+            <a:endParaRPr lang="en-US" sz="1200" b="1" dirty="0"/>
+          </a:p>
+        </p:txBody>
+      </p:sp>
     </p:spTree>
     <p:extLst>
       <p:ext uri="{BB962C8B-B14F-4D97-AF65-F5344CB8AC3E}">
@@ -4444,10 +5240,10 @@
       </p:grpSpPr>
       <p:pic>
         <p:nvPicPr>
-          <p:cNvPr id="2" name="Picture 1">
-            <a:extLst>
-              <a:ext uri="{FF2B5EF4-FFF2-40B4-BE49-F238E27FC236}">
-                <a16:creationId xmlns:a16="http://schemas.microsoft.com/office/drawing/2014/main" id="{6E48F301-D28F-475A-AAB9-F474077E5A4C}"/>
+          <p:cNvPr id="3" name="Picture 2">
+            <a:extLst>
+              <a:ext uri="{FF2B5EF4-FFF2-40B4-BE49-F238E27FC236}">
+                <a16:creationId xmlns:a16="http://schemas.microsoft.com/office/drawing/2014/main" id="{5E80AC59-528C-4C11-865C-696A56F6CA8F}"/>
               </a:ext>
             </a:extLst>
           </p:cNvPr>
@@ -4464,86 +5260,414 @@
         </p:blipFill>
         <p:spPr>
           <a:xfrm>
-            <a:off x="0" y="-194554"/>
-            <a:ext cx="12192000" cy="7052553"/>
+            <a:off x="0" y="0"/>
+            <a:ext cx="12192000" cy="6858000"/>
           </a:xfrm>
           <a:prstGeom prst="rect">
             <a:avLst/>
           </a:prstGeom>
         </p:spPr>
       </p:pic>
+      <p:sp>
+        <p:nvSpPr>
+          <p:cNvPr id="4" name="Arrow: Bent-Up 3">
+            <a:extLst>
+              <a:ext uri="{FF2B5EF4-FFF2-40B4-BE49-F238E27FC236}">
+                <a16:creationId xmlns:a16="http://schemas.microsoft.com/office/drawing/2014/main" id="{FB5477E0-6A22-437B-AB52-3569E56817BF}"/>
+              </a:ext>
+            </a:extLst>
+          </p:cNvPr>
+          <p:cNvSpPr/>
+          <p:nvPr/>
+        </p:nvSpPr>
+        <p:spPr>
+          <a:xfrm>
+            <a:off x="7264748" y="4014529"/>
+            <a:ext cx="1513983" cy="1302350"/>
+          </a:xfrm>
+          <a:prstGeom prst="bentUpArrow">
+            <a:avLst/>
+          </a:prstGeom>
+          <a:ln>
+            <a:noFill/>
+          </a:ln>
+          <a:effectLst>
+            <a:outerShdw blurRad="190500" dist="228600" dir="2700000" algn="ctr">
+              <a:srgbClr val="000000">
+                <a:alpha val="30000"/>
+              </a:srgbClr>
+            </a:outerShdw>
+          </a:effectLst>
+          <a:scene3d>
+            <a:camera prst="orthographicFront">
+              <a:rot lat="0" lon="0" rev="0"/>
+            </a:camera>
+            <a:lightRig rig="glow" dir="t">
+              <a:rot lat="0" lon="0" rev="4800000"/>
+            </a:lightRig>
+          </a:scene3d>
+          <a:sp3d prstMaterial="matte">
+            <a:bevelT w="127000" h="63500"/>
+          </a:sp3d>
+        </p:spPr>
+        <p:style>
+          <a:lnRef idx="2">
+            <a:schemeClr val="accent1">
+              <a:shade val="50000"/>
+            </a:schemeClr>
+          </a:lnRef>
+          <a:fillRef idx="1">
+            <a:schemeClr val="accent1"/>
+          </a:fillRef>
+          <a:effectRef idx="0">
+            <a:schemeClr val="accent1"/>
+          </a:effectRef>
+          <a:fontRef idx="minor">
+            <a:schemeClr val="lt1"/>
+          </a:fontRef>
+        </p:style>
+        <p:txBody>
+          <a:bodyPr rtlCol="0" anchor="ctr"/>
+          <a:lstStyle/>
+          <a:p>
+            <a:pPr algn="ctr"/>
+            <a:endParaRPr lang="en-US"/>
+          </a:p>
+        </p:txBody>
+      </p:sp>
+      <p:sp>
+        <p:nvSpPr>
+          <p:cNvPr id="11" name="Arrow: Down 10">
+            <a:extLst>
+              <a:ext uri="{FF2B5EF4-FFF2-40B4-BE49-F238E27FC236}">
+                <a16:creationId xmlns:a16="http://schemas.microsoft.com/office/drawing/2014/main" id="{AC72F3E6-9BCE-49CC-BB04-654A7A8C0EEA}"/>
+              </a:ext>
+            </a:extLst>
+          </p:cNvPr>
+          <p:cNvSpPr/>
+          <p:nvPr/>
+        </p:nvSpPr>
+        <p:spPr>
+          <a:xfrm rot="10800000">
+            <a:off x="4870233" y="2335580"/>
+            <a:ext cx="950259" cy="1918447"/>
+          </a:xfrm>
+          <a:prstGeom prst="downArrow">
+            <a:avLst/>
+          </a:prstGeom>
+          <a:ln>
+            <a:noFill/>
+          </a:ln>
+          <a:effectLst/>
+          <a:scene3d>
+            <a:camera prst="orthographicFront">
+              <a:rot lat="0" lon="0" rev="0"/>
+            </a:camera>
+            <a:lightRig rig="contrasting" dir="t">
+              <a:rot lat="0" lon="0" rev="7800000"/>
+            </a:lightRig>
+          </a:scene3d>
+          <a:sp3d>
+            <a:bevelT w="139700" h="139700"/>
+          </a:sp3d>
+        </p:spPr>
+        <p:style>
+          <a:lnRef idx="2">
+            <a:schemeClr val="accent1">
+              <a:shade val="50000"/>
+            </a:schemeClr>
+          </a:lnRef>
+          <a:fillRef idx="1">
+            <a:schemeClr val="accent1"/>
+          </a:fillRef>
+          <a:effectRef idx="0">
+            <a:schemeClr val="accent1"/>
+          </a:effectRef>
+          <a:fontRef idx="minor">
+            <a:schemeClr val="lt1"/>
+          </a:fontRef>
+        </p:style>
+        <p:txBody>
+          <a:bodyPr rtlCol="0" anchor="ctr"/>
+          <a:lstStyle/>
+          <a:p>
+            <a:pPr algn="ctr"/>
+            <a:endParaRPr lang="en-US"/>
+          </a:p>
+        </p:txBody>
+      </p:sp>
+      <p:sp>
+        <p:nvSpPr>
+          <p:cNvPr id="5" name="TextBox 4">
+            <a:extLst>
+              <a:ext uri="{FF2B5EF4-FFF2-40B4-BE49-F238E27FC236}">
+                <a16:creationId xmlns:a16="http://schemas.microsoft.com/office/drawing/2014/main" id="{52F9627D-3944-4C17-8206-106C3E87B53C}"/>
+              </a:ext>
+            </a:extLst>
+          </p:cNvPr>
+          <p:cNvSpPr txBox="1"/>
+          <p:nvPr/>
+        </p:nvSpPr>
+        <p:spPr>
+          <a:xfrm>
+            <a:off x="5107967" y="3429000"/>
+            <a:ext cx="2638780" cy="2286000"/>
+          </a:xfrm>
+          <a:prstGeom prst="rect">
+            <a:avLst/>
+          </a:prstGeom>
+          <a:solidFill>
+            <a:srgbClr val="5B9BD5"/>
+          </a:solidFill>
+          <a:ln>
+            <a:noFill/>
+          </a:ln>
+          <a:effectLst>
+            <a:outerShdw blurRad="190500" dist="228600" dir="2700000" algn="ctr">
+              <a:srgbClr val="000000">
+                <a:alpha val="30000"/>
+              </a:srgbClr>
+            </a:outerShdw>
+          </a:effectLst>
+          <a:scene3d>
+            <a:camera prst="orthographicFront">
+              <a:rot lat="0" lon="0" rev="0"/>
+            </a:camera>
+            <a:lightRig rig="glow" dir="t">
+              <a:rot lat="0" lon="0" rev="4800000"/>
+            </a:lightRig>
+          </a:scene3d>
+          <a:sp3d prstMaterial="matte">
+            <a:bevelT w="127000" h="63500"/>
+          </a:sp3d>
+        </p:spPr>
+        <p:txBody>
+          <a:bodyPr wrap="square" rtlCol="0">
+            <a:spAutoFit/>
+          </a:bodyPr>
+          <a:lstStyle/>
+          <a:p>
+            <a:endParaRPr lang="en-US" dirty="0"/>
+          </a:p>
+        </p:txBody>
+      </p:sp>
+      <p:sp>
+        <p:nvSpPr>
+          <p:cNvPr id="6" name="TextBox 5">
+            <a:extLst>
+              <a:ext uri="{FF2B5EF4-FFF2-40B4-BE49-F238E27FC236}">
+                <a16:creationId xmlns:a16="http://schemas.microsoft.com/office/drawing/2014/main" id="{E70A051F-9A83-4366-9569-3EBADD8ACD8D}"/>
+              </a:ext>
+            </a:extLst>
+          </p:cNvPr>
+          <p:cNvSpPr txBox="1"/>
+          <p:nvPr/>
+        </p:nvSpPr>
+        <p:spPr>
+          <a:xfrm>
+            <a:off x="5107967" y="5359984"/>
+            <a:ext cx="562979" cy="276999"/>
+          </a:xfrm>
+          <a:prstGeom prst="rect">
+            <a:avLst/>
+          </a:prstGeom>
+          <a:noFill/>
+        </p:spPr>
+        <p:txBody>
+          <a:bodyPr wrap="square" rtlCol="0">
+            <a:spAutoFit/>
+          </a:bodyPr>
+          <a:lstStyle/>
+          <a:p>
+            <a:pPr algn="ctr"/>
+            <a:r>
+              <a:rPr lang="en-US" sz="1200" b="1" i="1" dirty="0"/>
+              <a:t>back</a:t>
+            </a:r>
+          </a:p>
+        </p:txBody>
+      </p:sp>
+      <p:sp>
+        <p:nvSpPr>
+          <p:cNvPr id="7" name="TextBox 6">
+            <a:extLst>
+              <a:ext uri="{FF2B5EF4-FFF2-40B4-BE49-F238E27FC236}">
+                <a16:creationId xmlns:a16="http://schemas.microsoft.com/office/drawing/2014/main" id="{F1F9A876-2CD4-432B-A989-B31F5DE28673}"/>
+              </a:ext>
+            </a:extLst>
+          </p:cNvPr>
+          <p:cNvSpPr txBox="1"/>
+          <p:nvPr/>
+        </p:nvSpPr>
+        <p:spPr>
+          <a:xfrm>
+            <a:off x="6161881" y="5338024"/>
+            <a:ext cx="562979" cy="276999"/>
+          </a:xfrm>
+          <a:prstGeom prst="rect">
+            <a:avLst/>
+          </a:prstGeom>
+          <a:noFill/>
+        </p:spPr>
+        <p:txBody>
+          <a:bodyPr wrap="square" rtlCol="0">
+            <a:spAutoFit/>
+          </a:bodyPr>
+          <a:lstStyle/>
+          <a:p>
+            <a:pPr algn="ctr"/>
+            <a:r>
+              <a:rPr lang="en-US" sz="1200" dirty="0"/>
+              <a:t>next</a:t>
+            </a:r>
+          </a:p>
+        </p:txBody>
+      </p:sp>
+      <p:sp>
+        <p:nvSpPr>
+          <p:cNvPr id="8" name="TextBox 7">
+            <a:extLst>
+              <a:ext uri="{FF2B5EF4-FFF2-40B4-BE49-F238E27FC236}">
+                <a16:creationId xmlns:a16="http://schemas.microsoft.com/office/drawing/2014/main" id="{06465439-6B40-4FE9-8D6A-93D1E6A5A166}"/>
+              </a:ext>
+            </a:extLst>
+          </p:cNvPr>
+          <p:cNvSpPr txBox="1"/>
+          <p:nvPr/>
+        </p:nvSpPr>
+        <p:spPr>
+          <a:xfrm>
+            <a:off x="7242817" y="5333165"/>
+            <a:ext cx="420563" cy="276999"/>
+          </a:xfrm>
+          <a:prstGeom prst="rect">
+            <a:avLst/>
+          </a:prstGeom>
+          <a:noFill/>
+        </p:spPr>
+        <p:txBody>
+          <a:bodyPr wrap="square" rtlCol="0">
+            <a:spAutoFit/>
+          </a:bodyPr>
+          <a:lstStyle/>
+          <a:p>
+            <a:pPr algn="ctr"/>
+            <a:r>
+              <a:rPr lang="en-US" sz="1200" dirty="0"/>
+              <a:t>end</a:t>
+            </a:r>
+          </a:p>
+        </p:txBody>
+      </p:sp>
+      <p:sp>
+        <p:nvSpPr>
+          <p:cNvPr id="10" name="TextBox 9">
+            <a:extLst>
+              <a:ext uri="{FF2B5EF4-FFF2-40B4-BE49-F238E27FC236}">
+                <a16:creationId xmlns:a16="http://schemas.microsoft.com/office/drawing/2014/main" id="{55DF14E5-A5F3-4E82-99CE-285FE151378B}"/>
+              </a:ext>
+            </a:extLst>
+          </p:cNvPr>
+          <p:cNvSpPr txBox="1"/>
+          <p:nvPr/>
+        </p:nvSpPr>
+        <p:spPr>
+          <a:xfrm>
+            <a:off x="5582758" y="3414652"/>
+            <a:ext cx="1721223" cy="461665"/>
+          </a:xfrm>
+          <a:prstGeom prst="rect">
+            <a:avLst/>
+          </a:prstGeom>
+          <a:noFill/>
+        </p:spPr>
+        <p:txBody>
+          <a:bodyPr wrap="square" rtlCol="0">
+            <a:spAutoFit/>
+          </a:bodyPr>
+          <a:lstStyle/>
+          <a:p>
+            <a:pPr algn="ctr"/>
+            <a:r>
+              <a:rPr lang="en-US" sz="2400" b="1" dirty="0"/>
+              <a:t>Artboard</a:t>
+            </a:r>
+          </a:p>
+        </p:txBody>
+      </p:sp>
+      <p:sp>
+        <p:nvSpPr>
+          <p:cNvPr id="9" name="TextBox 8">
+            <a:extLst>
+              <a:ext uri="{FF2B5EF4-FFF2-40B4-BE49-F238E27FC236}">
+                <a16:creationId xmlns:a16="http://schemas.microsoft.com/office/drawing/2014/main" id="{5824EB0E-07FB-45FD-9284-6967A6CFC192}"/>
+              </a:ext>
+            </a:extLst>
+          </p:cNvPr>
+          <p:cNvSpPr txBox="1"/>
+          <p:nvPr/>
+        </p:nvSpPr>
+        <p:spPr>
+          <a:xfrm>
+            <a:off x="5137492" y="3811960"/>
+            <a:ext cx="2638780" cy="1569660"/>
+          </a:xfrm>
+          <a:prstGeom prst="rect">
+            <a:avLst/>
+          </a:prstGeom>
+          <a:noFill/>
+        </p:spPr>
+        <p:txBody>
+          <a:bodyPr wrap="square" rtlCol="0">
+            <a:spAutoFit/>
+          </a:bodyPr>
+          <a:lstStyle/>
+          <a:p>
+            <a:r>
+              <a:rPr lang="en-US" sz="1200" dirty="0"/>
+              <a:t>The new artboard that you created by pressing the button in the previous step is on </a:t>
+            </a:r>
+            <a:r>
+              <a:rPr lang="en-US" sz="1200" b="1" dirty="0"/>
+              <a:t>layer 2</a:t>
+            </a:r>
+            <a:r>
+              <a:rPr lang="en-US" sz="1200" dirty="0"/>
+              <a:t> and named </a:t>
+            </a:r>
+            <a:r>
+              <a:rPr lang="en-US" sz="1200" b="1" dirty="0"/>
+              <a:t>“Artboard 3”</a:t>
+            </a:r>
+            <a:r>
+              <a:rPr lang="en-US" sz="1200" dirty="0"/>
+              <a:t> by default. You can change the name by double clicking on the artboard name.</a:t>
+            </a:r>
+          </a:p>
+          <a:p>
+            <a:endParaRPr lang="en-US" sz="1200" dirty="0"/>
+          </a:p>
+          <a:p>
+            <a:r>
+              <a:rPr lang="en-US" sz="1200" dirty="0"/>
+              <a:t>Press </a:t>
+            </a:r>
+            <a:r>
+              <a:rPr lang="en-US" sz="1200" b="1" dirty="0"/>
+              <a:t>back </a:t>
+            </a:r>
+            <a:r>
+              <a:rPr lang="en-US" sz="1200" dirty="0"/>
+              <a:t>to go to a previous step.</a:t>
+            </a:r>
+            <a:endParaRPr lang="en-US" sz="1200" b="1" dirty="0"/>
+          </a:p>
+        </p:txBody>
+      </p:sp>
     </p:spTree>
     <p:extLst>
       <p:ext uri="{BB962C8B-B14F-4D97-AF65-F5344CB8AC3E}">
         <p14:creationId xmlns:p14="http://schemas.microsoft.com/office/powerpoint/2010/main" val="2404552178"/>
-      </p:ext>
-    </p:extLst>
-  </p:cSld>
-  <p:clrMapOvr>
-    <a:masterClrMapping/>
-  </p:clrMapOvr>
-  <mc:AlternateContent xmlns:mc="http://schemas.openxmlformats.org/markup-compatibility/2006" xmlns:p14="http://schemas.microsoft.com/office/powerpoint/2010/main">
-    <mc:Choice Requires="p14">
-      <p:transition spd="slow" p14:dur="2000" advTm="4126"/>
-    </mc:Choice>
-    <mc:Fallback xmlns="">
-      <p:transition spd="slow" advTm="4126"/>
-    </mc:Fallback>
-  </mc:AlternateContent>
-</p:sld>
-</file>
-
-<file path=ppt/slides/slide7.xml><?xml version="1.0" encoding="utf-8"?>
-<p:sld xmlns:a="http://schemas.openxmlformats.org/drawingml/2006/main" xmlns:r="http://schemas.openxmlformats.org/officeDocument/2006/relationships" xmlns:p="http://schemas.openxmlformats.org/presentationml/2006/main">
-  <p:cSld>
-    <p:spTree>
-      <p:nvGrpSpPr>
-        <p:cNvPr id="1" name=""/>
-        <p:cNvGrpSpPr/>
-        <p:nvPr/>
-      </p:nvGrpSpPr>
-      <p:grpSpPr>
-        <a:xfrm>
-          <a:off x="0" y="0"/>
-          <a:ext cx="0" cy="0"/>
-          <a:chOff x="0" y="0"/>
-          <a:chExt cx="0" cy="0"/>
-        </a:xfrm>
-      </p:grpSpPr>
-      <p:pic>
-        <p:nvPicPr>
-          <p:cNvPr id="2" name="Picture 1">
-            <a:extLst>
-              <a:ext uri="{FF2B5EF4-FFF2-40B4-BE49-F238E27FC236}">
-                <a16:creationId xmlns:a16="http://schemas.microsoft.com/office/drawing/2014/main" id="{6E48F301-D28F-475A-AAB9-F474077E5A4C}"/>
-              </a:ext>
-            </a:extLst>
-          </p:cNvPr>
-          <p:cNvPicPr>
-            <a:picLocks noChangeAspect="1"/>
-          </p:cNvPicPr>
-          <p:nvPr/>
-        </p:nvPicPr>
-        <p:blipFill>
-          <a:blip r:embed="rId2"/>
-          <a:stretch>
-            <a:fillRect/>
-          </a:stretch>
-        </p:blipFill>
-        <p:spPr>
-          <a:xfrm>
-            <a:off x="0" y="-194554"/>
-            <a:ext cx="12192000" cy="7052553"/>
-          </a:xfrm>
-          <a:prstGeom prst="rect">
-            <a:avLst/>
-          </a:prstGeom>
-        </p:spPr>
-      </p:pic>
-    </p:spTree>
-    <p:extLst>
-      <p:ext uri="{BB962C8B-B14F-4D97-AF65-F5344CB8AC3E}">
-        <p14:creationId xmlns:p14="http://schemas.microsoft.com/office/powerpoint/2010/main" val="4158168536"/>
       </p:ext>
     </p:extLst>
   </p:cSld>
@@ -4578,7 +5702,7 @@
         <a:srgbClr val="E7E6E6"/>
       </a:lt2>
       <a:accent1>
-        <a:srgbClr val="5B9BD5"/>
+        <a:srgbClr val="4472C4"/>
       </a:accent1>
       <a:accent2>
         <a:srgbClr val="ED7D31"/>
@@ -4590,7 +5714,7 @@
         <a:srgbClr val="FFC000"/>
       </a:accent4>
       <a:accent5>
-        <a:srgbClr val="4472C4"/>
+        <a:srgbClr val="5B9BD5"/>
       </a:accent5>
       <a:accent6>
         <a:srgbClr val="70AD47"/>
@@ -4607,9 +5731,9 @@
         <a:latin typeface="Calibri Light" panose="020F0302020204030204"/>
         <a:ea typeface=""/>
         <a:cs typeface=""/>
-        <a:font script="Jpan" typeface="ＭＳ Ｐゴシック"/>
+        <a:font script="Jpan" typeface="游ゴシック Light"/>
         <a:font script="Hang" typeface="맑은 고딕"/>
-        <a:font script="Hans" typeface="宋体"/>
+        <a:font script="Hans" typeface="等线 Light"/>
         <a:font script="Hant" typeface="新細明體"/>
         <a:font script="Arab" typeface="Times New Roman"/>
         <a:font script="Hebr" typeface="Times New Roman"/>
@@ -4637,14 +5761,31 @@
         <a:font script="Viet" typeface="Times New Roman"/>
         <a:font script="Uigh" typeface="Microsoft Uighur"/>
         <a:font script="Geor" typeface="Sylfaen"/>
+        <a:font script="Armn" typeface="Arial"/>
+        <a:font script="Bugi" typeface="Leelawadee UI"/>
+        <a:font script="Bopo" typeface="Microsoft JhengHei"/>
+        <a:font script="Java" typeface="Javanese Text"/>
+        <a:font script="Lisu" typeface="Segoe UI"/>
+        <a:font script="Mymr" typeface="Myanmar Text"/>
+        <a:font script="Nkoo" typeface="Ebrima"/>
+        <a:font script="Olck" typeface="Nirmala UI"/>
+        <a:font script="Osma" typeface="Ebrima"/>
+        <a:font script="Phag" typeface="Phagspa"/>
+        <a:font script="Syrn" typeface="Estrangelo Edessa"/>
+        <a:font script="Syrj" typeface="Estrangelo Edessa"/>
+        <a:font script="Syre" typeface="Estrangelo Edessa"/>
+        <a:font script="Sora" typeface="Nirmala UI"/>
+        <a:font script="Tale" typeface="Microsoft Tai Le"/>
+        <a:font script="Talu" typeface="Microsoft New Tai Lue"/>
+        <a:font script="Tfng" typeface="Ebrima"/>
       </a:majorFont>
       <a:minorFont>
         <a:latin typeface="Calibri" panose="020F0502020204030204"/>
         <a:ea typeface=""/>
         <a:cs typeface=""/>
-        <a:font script="Jpan" typeface="ＭＳ Ｐゴシック"/>
+        <a:font script="Jpan" typeface="游ゴシック"/>
         <a:font script="Hang" typeface="맑은 고딕"/>
-        <a:font script="Hans" typeface="宋体"/>
+        <a:font script="Hans" typeface="等线"/>
         <a:font script="Hant" typeface="新細明體"/>
         <a:font script="Arab" typeface="Arial"/>
         <a:font script="Hebr" typeface="Arial"/>
@@ -4672,6 +5813,23 @@
         <a:font script="Viet" typeface="Arial"/>
         <a:font script="Uigh" typeface="Microsoft Uighur"/>
         <a:font script="Geor" typeface="Sylfaen"/>
+        <a:font script="Armn" typeface="Arial"/>
+        <a:font script="Bugi" typeface="Leelawadee UI"/>
+        <a:font script="Bopo" typeface="Microsoft JhengHei"/>
+        <a:font script="Java" typeface="Javanese Text"/>
+        <a:font script="Lisu" typeface="Segoe UI"/>
+        <a:font script="Mymr" typeface="Myanmar Text"/>
+        <a:font script="Nkoo" typeface="Ebrima"/>
+        <a:font script="Olck" typeface="Nirmala UI"/>
+        <a:font script="Osma" typeface="Ebrima"/>
+        <a:font script="Phag" typeface="Phagspa"/>
+        <a:font script="Syrn" typeface="Estrangelo Edessa"/>
+        <a:font script="Syrj" typeface="Estrangelo Edessa"/>
+        <a:font script="Syre" typeface="Estrangelo Edessa"/>
+        <a:font script="Sora" typeface="Nirmala UI"/>
+        <a:font script="Tale" typeface="Microsoft Tai Le"/>
+        <a:font script="Talu" typeface="Microsoft New Tai Lue"/>
+        <a:font script="Tfng" typeface="Ebrima"/>
       </a:minorFont>
     </a:fontScheme>
     <a:fmtScheme name="Office">

</xml_diff>